<commit_message>
More work on the front cover
(No final product yet, just wanted to sync these changes so far.)
</commit_message>
<xml_diff>
--- a/StudentGuideModule1/131_front_pages/131_front_cover.pptx
+++ b/StudentGuideModule1/131_front_pages/131_front_cover.pptx
@@ -6,6 +6,7 @@
   </p:sldMasterIdLst>
   <p:sldIdLst>
     <p:sldId id="256" r:id="rId2"/>
+    <p:sldId id="257" r:id="rId3"/>
   </p:sldIdLst>
   <p:sldSz cx="7772400" cy="10058400"/>
   <p:notesSz cx="7315200" cy="9601200"/>
@@ -289,7 +290,7 @@
             <a:fld id="{1D8BD707-D9CF-40AE-B4C6-C98DA3205C09}" type="datetimeFigureOut">
               <a:rPr lang="en-US" smtClean="0"/>
               <a:pPr/>
-              <a:t>4/24/2016</a:t>
+              <a:t>5/10/2016</a:t>
             </a:fld>
             <a:endParaRPr lang="en-US"/>
           </a:p>
@@ -456,7 +457,7 @@
             <a:fld id="{1D8BD707-D9CF-40AE-B4C6-C98DA3205C09}" type="datetimeFigureOut">
               <a:rPr lang="en-US" smtClean="0"/>
               <a:pPr/>
-              <a:t>4/24/2016</a:t>
+              <a:t>5/10/2016</a:t>
             </a:fld>
             <a:endParaRPr lang="en-US"/>
           </a:p>
@@ -633,7 +634,7 @@
             <a:fld id="{1D8BD707-D9CF-40AE-B4C6-C98DA3205C09}" type="datetimeFigureOut">
               <a:rPr lang="en-US" smtClean="0"/>
               <a:pPr/>
-              <a:t>4/24/2016</a:t>
+              <a:t>5/10/2016</a:t>
             </a:fld>
             <a:endParaRPr lang="en-US"/>
           </a:p>
@@ -800,7 +801,7 @@
             <a:fld id="{1D8BD707-D9CF-40AE-B4C6-C98DA3205C09}" type="datetimeFigureOut">
               <a:rPr lang="en-US" smtClean="0"/>
               <a:pPr/>
-              <a:t>4/24/2016</a:t>
+              <a:t>5/10/2016</a:t>
             </a:fld>
             <a:endParaRPr lang="en-US"/>
           </a:p>
@@ -1043,7 +1044,7 @@
             <a:fld id="{1D8BD707-D9CF-40AE-B4C6-C98DA3205C09}" type="datetimeFigureOut">
               <a:rPr lang="en-US" smtClean="0"/>
               <a:pPr/>
-              <a:t>4/24/2016</a:t>
+              <a:t>5/10/2016</a:t>
             </a:fld>
             <a:endParaRPr lang="en-US"/>
           </a:p>
@@ -1328,7 +1329,7 @@
             <a:fld id="{1D8BD707-D9CF-40AE-B4C6-C98DA3205C09}" type="datetimeFigureOut">
               <a:rPr lang="en-US" smtClean="0"/>
               <a:pPr/>
-              <a:t>4/24/2016</a:t>
+              <a:t>5/10/2016</a:t>
             </a:fld>
             <a:endParaRPr lang="en-US"/>
           </a:p>
@@ -1747,7 +1748,7 @@
             <a:fld id="{1D8BD707-D9CF-40AE-B4C6-C98DA3205C09}" type="datetimeFigureOut">
               <a:rPr lang="en-US" smtClean="0"/>
               <a:pPr/>
-              <a:t>4/24/2016</a:t>
+              <a:t>5/10/2016</a:t>
             </a:fld>
             <a:endParaRPr lang="en-US"/>
           </a:p>
@@ -1862,7 +1863,7 @@
             <a:fld id="{1D8BD707-D9CF-40AE-B4C6-C98DA3205C09}" type="datetimeFigureOut">
               <a:rPr lang="en-US" smtClean="0"/>
               <a:pPr/>
-              <a:t>4/24/2016</a:t>
+              <a:t>5/10/2016</a:t>
             </a:fld>
             <a:endParaRPr lang="en-US"/>
           </a:p>
@@ -1954,7 +1955,7 @@
             <a:fld id="{1D8BD707-D9CF-40AE-B4C6-C98DA3205C09}" type="datetimeFigureOut">
               <a:rPr lang="en-US" smtClean="0"/>
               <a:pPr/>
-              <a:t>4/24/2016</a:t>
+              <a:t>5/10/2016</a:t>
             </a:fld>
             <a:endParaRPr lang="en-US"/>
           </a:p>
@@ -2228,7 +2229,7 @@
             <a:fld id="{1D8BD707-D9CF-40AE-B4C6-C98DA3205C09}" type="datetimeFigureOut">
               <a:rPr lang="en-US" smtClean="0"/>
               <a:pPr/>
-              <a:t>4/24/2016</a:t>
+              <a:t>5/10/2016</a:t>
             </a:fld>
             <a:endParaRPr lang="en-US"/>
           </a:p>
@@ -2478,7 +2479,7 @@
             <a:fld id="{1D8BD707-D9CF-40AE-B4C6-C98DA3205C09}" type="datetimeFigureOut">
               <a:rPr lang="en-US" smtClean="0"/>
               <a:pPr/>
-              <a:t>4/24/2016</a:t>
+              <a:t>5/10/2016</a:t>
             </a:fld>
             <a:endParaRPr lang="en-US"/>
           </a:p>
@@ -2688,7 +2689,7 @@
             <a:fld id="{1D8BD707-D9CF-40AE-B4C6-C98DA3205C09}" type="datetimeFigureOut">
               <a:rPr lang="en-US" smtClean="0"/>
               <a:pPr/>
-              <a:t>4/24/2016</a:t>
+              <a:t>5/10/2016</a:t>
             </a:fld>
             <a:endParaRPr lang="en-US"/>
           </a:p>
@@ -5101,6 +5102,2062 @@
 </p:sld>
 </file>
 
+<file path=ppt/slides/slide2.xml><?xml version="1.0" encoding="utf-8"?>
+<p:sld xmlns:a="http://schemas.openxmlformats.org/drawingml/2006/main" xmlns:r="http://schemas.openxmlformats.org/officeDocument/2006/relationships" xmlns:p="http://schemas.openxmlformats.org/presentationml/2006/main">
+  <p:cSld>
+    <p:spTree>
+      <p:nvGrpSpPr>
+        <p:cNvPr id="1" name=""/>
+        <p:cNvGrpSpPr/>
+        <p:nvPr/>
+      </p:nvGrpSpPr>
+      <p:grpSpPr>
+        <a:xfrm>
+          <a:off x="0" y="0"/>
+          <a:ext cx="0" cy="0"/>
+          <a:chOff x="0" y="0"/>
+          <a:chExt cx="0" cy="0"/>
+        </a:xfrm>
+      </p:grpSpPr>
+      <p:sp>
+        <p:nvSpPr>
+          <p:cNvPr id="4" name="Rectangle 3"/>
+          <p:cNvSpPr/>
+          <p:nvPr/>
+        </p:nvSpPr>
+        <p:spPr>
+          <a:xfrm>
+            <a:off x="0" y="0"/>
+            <a:ext cx="7772400" cy="10058400"/>
+          </a:xfrm>
+          <a:prstGeom prst="rect">
+            <a:avLst/>
+          </a:prstGeom>
+          <a:solidFill>
+            <a:srgbClr val="0000A0"/>
+          </a:solidFill>
+          <a:ln>
+            <a:noFill/>
+          </a:ln>
+        </p:spPr>
+        <p:style>
+          <a:lnRef idx="2">
+            <a:schemeClr val="accent1">
+              <a:shade val="50000"/>
+            </a:schemeClr>
+          </a:lnRef>
+          <a:fillRef idx="1">
+            <a:schemeClr val="accent1"/>
+          </a:fillRef>
+          <a:effectRef idx="0">
+            <a:schemeClr val="accent1"/>
+          </a:effectRef>
+          <a:fontRef idx="minor">
+            <a:schemeClr val="lt1"/>
+          </a:fontRef>
+        </p:style>
+        <p:txBody>
+          <a:bodyPr rtlCol="0" anchor="ctr"/>
+          <a:lstStyle/>
+          <a:p>
+            <a:pPr algn="ctr"/>
+            <a:endParaRPr lang="en-US"/>
+          </a:p>
+        </p:txBody>
+      </p:sp>
+      <p:sp>
+        <p:nvSpPr>
+          <p:cNvPr id="5" name="Parallelogram 4"/>
+          <p:cNvSpPr/>
+          <p:nvPr/>
+        </p:nvSpPr>
+        <p:spPr>
+          <a:xfrm>
+            <a:off x="1667641" y="1829943"/>
+            <a:ext cx="4389120" cy="1088136"/>
+          </a:xfrm>
+          <a:prstGeom prst="parallelogram">
+            <a:avLst>
+              <a:gd name="adj" fmla="val 19588"/>
+            </a:avLst>
+          </a:prstGeom>
+          <a:solidFill>
+            <a:srgbClr val="C00000"/>
+          </a:solidFill>
+          <a:ln w="50800" cmpd="thickThin">
+            <a:solidFill>
+              <a:srgbClr val="FFFF00"/>
+            </a:solidFill>
+          </a:ln>
+        </p:spPr>
+        <p:txBody>
+          <a:bodyPr wrap="square" lIns="101882" tIns="50941" rIns="101882" bIns="50941" rtlCol="0">
+            <a:spAutoFit/>
+          </a:bodyPr>
+          <a:lstStyle/>
+          <a:p>
+            <a:pPr lvl="0" algn="ctr"/>
+            <a:endParaRPr lang="en-US" sz="2300" dirty="0">
+              <a:solidFill>
+                <a:prstClr val="black"/>
+              </a:solidFill>
+            </a:endParaRPr>
+          </a:p>
+        </p:txBody>
+      </p:sp>
+      <p:sp>
+        <p:nvSpPr>
+          <p:cNvPr id="6" name="MAIN TITLE BOX"/>
+          <p:cNvSpPr txBox="1"/>
+          <p:nvPr/>
+        </p:nvSpPr>
+        <p:spPr>
+          <a:xfrm>
+            <a:off x="1750060" y="1828800"/>
+            <a:ext cx="4272280" cy="1087762"/>
+          </a:xfrm>
+          <a:prstGeom prst="rect">
+            <a:avLst/>
+          </a:prstGeom>
+          <a:noFill/>
+          <a:ln w="50800" cmpd="thickThin">
+            <a:noFill/>
+          </a:ln>
+        </p:spPr>
+        <p:txBody>
+          <a:bodyPr wrap="square" lIns="101882" tIns="50941" rIns="101882" bIns="50941" rtlCol="0">
+            <a:spAutoFit/>
+          </a:bodyPr>
+          <a:lstStyle/>
+          <a:p>
+            <a:pPr algn="ctr"/>
+            <a:r>
+              <a:rPr lang="en-US" sz="4000" b="1" i="1" dirty="0" smtClean="0">
+                <a:solidFill>
+                  <a:schemeClr val="bg1"/>
+                </a:solidFill>
+              </a:rPr>
+              <a:t>Physics For Doing!</a:t>
+            </a:r>
+          </a:p>
+          <a:p>
+            <a:r>
+              <a:rPr lang="en-US" sz="2300" dirty="0" smtClean="0">
+                <a:solidFill>
+                  <a:schemeClr val="bg1"/>
+                </a:solidFill>
+              </a:rPr>
+              <a:t> Part </a:t>
+            </a:r>
+            <a:r>
+              <a:rPr lang="en-US" sz="2300" dirty="0" smtClean="0">
+                <a:solidFill>
+                  <a:schemeClr val="bg1"/>
+                </a:solidFill>
+              </a:rPr>
+              <a:t>1: </a:t>
+            </a:r>
+            <a:r>
+              <a:rPr lang="en-US" sz="2300" dirty="0" smtClean="0">
+                <a:solidFill>
+                  <a:schemeClr val="bg1"/>
+                </a:solidFill>
+              </a:rPr>
+              <a:t>Activities for Physics </a:t>
+            </a:r>
+            <a:r>
+              <a:rPr lang="en-US" sz="2300" dirty="0" smtClean="0">
+                <a:solidFill>
+                  <a:schemeClr val="bg1"/>
+                </a:solidFill>
+              </a:rPr>
+              <a:t>131</a:t>
+            </a:r>
+            <a:endParaRPr lang="en-US" sz="2300" dirty="0">
+              <a:solidFill>
+                <a:schemeClr val="bg1"/>
+              </a:solidFill>
+            </a:endParaRPr>
+          </a:p>
+        </p:txBody>
+      </p:sp>
+      <p:pic>
+        <p:nvPicPr>
+          <p:cNvPr id="1028" name="monkey picture" descr="C:\Users\mtrawick\Desktop\github\131\StudentGuideModule1\131_front_pages\monkey6.tif"/>
+          <p:cNvPicPr>
+            <a:picLocks noChangeAspect="1" noChangeArrowheads="1"/>
+          </p:cNvPicPr>
+          <p:nvPr/>
+        </p:nvPicPr>
+        <p:blipFill>
+          <a:blip r:embed="rId2" cstate="print">
+            <a:extLst>
+              <a:ext uri="{28A0092B-C50C-407E-A947-70E740481C1C}">
+                <a14:useLocalDpi xmlns:a14="http://schemas.microsoft.com/office/drawing/2010/main" val="0"/>
+              </a:ext>
+            </a:extLst>
+          </a:blip>
+          <a:srcRect/>
+          <a:stretch>
+            <a:fillRect/>
+          </a:stretch>
+        </p:blipFill>
+        <p:spPr bwMode="auto">
+          <a:xfrm>
+            <a:off x="1889760" y="560396"/>
+            <a:ext cx="4187190" cy="1229811"/>
+          </a:xfrm>
+          <a:prstGeom prst="rect">
+            <a:avLst/>
+          </a:prstGeom>
+          <a:noFill/>
+          <a:extLst>
+            <a:ext uri="{909E8E84-426E-40DD-AFC4-6F175D3DCCD1}">
+              <a14:hiddenFill xmlns:a14="http://schemas.microsoft.com/office/drawing/2010/main">
+                <a:solidFill>
+                  <a:srgbClr val="FFFFFF"/>
+                </a:solidFill>
+              </a14:hiddenFill>
+            </a:ext>
+          </a:extLst>
+        </p:spPr>
+      </p:pic>
+      <p:grpSp>
+        <p:nvGrpSpPr>
+          <p:cNvPr id="100" name="pulleys"/>
+          <p:cNvGrpSpPr/>
+          <p:nvPr/>
+        </p:nvGrpSpPr>
+        <p:grpSpPr>
+          <a:xfrm>
+            <a:off x="3356179" y="2957823"/>
+            <a:ext cx="911860" cy="2381250"/>
+            <a:chOff x="0" y="0"/>
+            <a:chExt cx="911860" cy="2381250"/>
+          </a:xfrm>
+        </p:grpSpPr>
+        <p:grpSp>
+          <p:nvGrpSpPr>
+            <p:cNvPr id="103" name="right"/>
+            <p:cNvGrpSpPr/>
+            <p:nvPr/>
+          </p:nvGrpSpPr>
+          <p:grpSpPr>
+            <a:xfrm>
+              <a:off x="546100" y="469900"/>
+              <a:ext cx="365760" cy="1911350"/>
+              <a:chOff x="120161" y="-239085"/>
+              <a:chExt cx="365760" cy="1911968"/>
+            </a:xfrm>
+          </p:grpSpPr>
+          <p:grpSp>
+            <p:nvGrpSpPr>
+              <p:cNvPr id="128" name="scale"/>
+              <p:cNvGrpSpPr/>
+              <p:nvPr/>
+            </p:nvGrpSpPr>
+            <p:grpSpPr>
+              <a:xfrm rot="16200000">
+                <a:off x="-132348" y="612068"/>
+                <a:ext cx="894419" cy="144145"/>
+                <a:chOff x="0" y="0"/>
+                <a:chExt cx="1199707" cy="193675"/>
+              </a:xfrm>
+            </p:grpSpPr>
+            <p:sp>
+              <p:nvSpPr>
+                <p:cNvPr id="132" name="Hexagon 131"/>
+                <p:cNvSpPr/>
+                <p:nvPr/>
+              </p:nvSpPr>
+              <p:spPr>
+                <a:xfrm>
+                  <a:off x="131135" y="0"/>
+                  <a:ext cx="975360" cy="193675"/>
+                </a:xfrm>
+                <a:prstGeom prst="hexagon">
+                  <a:avLst>
+                    <a:gd name="adj" fmla="val 51829"/>
+                    <a:gd name="vf" fmla="val 115470"/>
+                  </a:avLst>
+                </a:prstGeom>
+                <a:solidFill>
+                  <a:sysClr val="window" lastClr="FFFFFF"/>
+                </a:solidFill>
+                <a:ln w="19050" cap="flat" cmpd="sng" algn="ctr">
+                  <a:solidFill>
+                    <a:sysClr val="windowText" lastClr="000000"/>
+                  </a:solidFill>
+                  <a:prstDash val="solid"/>
+                </a:ln>
+                <a:effectLst/>
+              </p:spPr>
+              <p:txBody>
+                <a:bodyPr rot="0" spcFirstLastPara="0" vert="horz" wrap="square" lIns="91440" tIns="45720" rIns="91440" bIns="45720" numCol="1" spcCol="0" rtlCol="0" fromWordArt="0" anchor="ctr" anchorCtr="0" forceAA="0" compatLnSpc="1">
+                  <a:prstTxWarp prst="textNoShape">
+                    <a:avLst/>
+                  </a:prstTxWarp>
+                  <a:noAutofit/>
+                </a:bodyPr>
+                <a:lstStyle/>
+                <a:p>
+                  <a:pPr marL="0" marR="0" lvl="0" indent="0" defTabSz="914400" eaLnBrk="1" fontAlgn="auto" latinLnBrk="0" hangingPunct="1">
+                    <a:lnSpc>
+                      <a:spcPct val="100000"/>
+                    </a:lnSpc>
+                    <a:spcBef>
+                      <a:spcPts val="0"/>
+                    </a:spcBef>
+                    <a:spcAft>
+                      <a:spcPts val="0"/>
+                    </a:spcAft>
+                    <a:buClrTx/>
+                    <a:buSzTx/>
+                    <a:buFontTx/>
+                    <a:buNone/>
+                    <a:tabLst/>
+                    <a:defRPr/>
+                  </a:pPr>
+                  <a:endParaRPr kumimoji="0" lang="en-US" sz="1800" b="0" i="0" u="none" strike="noStrike" kern="0" cap="none" spc="0" normalizeH="0" baseline="0" noProof="0">
+                    <a:ln>
+                      <a:noFill/>
+                    </a:ln>
+                    <a:solidFill>
+                      <a:sysClr val="window" lastClr="FFFFFF"/>
+                    </a:solidFill>
+                    <a:effectLst/>
+                    <a:uLnTx/>
+                    <a:uFillTx/>
+                    <a:latin typeface="Calibri"/>
+                    <a:ea typeface="+mn-ea"/>
+                    <a:cs typeface="+mn-cs"/>
+                  </a:endParaRPr>
+                </a:p>
+              </p:txBody>
+            </p:sp>
+            <p:sp>
+              <p:nvSpPr>
+                <p:cNvPr id="133" name="Rectangle 132"/>
+                <p:cNvSpPr/>
+                <p:nvPr/>
+              </p:nvSpPr>
+              <p:spPr>
+                <a:xfrm>
+                  <a:off x="377456" y="74428"/>
+                  <a:ext cx="482600" cy="45720"/>
+                </a:xfrm>
+                <a:prstGeom prst="rect">
+                  <a:avLst/>
+                </a:prstGeom>
+                <a:solidFill>
+                  <a:sysClr val="window" lastClr="FFFFFF"/>
+                </a:solidFill>
+                <a:ln w="12700" cap="flat" cmpd="sng" algn="ctr">
+                  <a:solidFill>
+                    <a:sysClr val="windowText" lastClr="000000"/>
+                  </a:solidFill>
+                  <a:prstDash val="solid"/>
+                </a:ln>
+                <a:effectLst/>
+              </p:spPr>
+              <p:txBody>
+                <a:bodyPr rot="0" spcFirstLastPara="0" vert="horz" wrap="square" lIns="91440" tIns="45720" rIns="91440" bIns="45720" numCol="1" spcCol="0" rtlCol="0" fromWordArt="0" anchor="ctr" anchorCtr="0" forceAA="0" compatLnSpc="1">
+                  <a:prstTxWarp prst="textNoShape">
+                    <a:avLst/>
+                  </a:prstTxWarp>
+                  <a:noAutofit/>
+                </a:bodyPr>
+                <a:lstStyle/>
+                <a:p>
+                  <a:pPr marL="0" marR="0" lvl="0" indent="0" defTabSz="914400" eaLnBrk="1" fontAlgn="auto" latinLnBrk="0" hangingPunct="1">
+                    <a:lnSpc>
+                      <a:spcPct val="100000"/>
+                    </a:lnSpc>
+                    <a:spcBef>
+                      <a:spcPts val="0"/>
+                    </a:spcBef>
+                    <a:spcAft>
+                      <a:spcPts val="0"/>
+                    </a:spcAft>
+                    <a:buClrTx/>
+                    <a:buSzTx/>
+                    <a:buFontTx/>
+                    <a:buNone/>
+                    <a:tabLst/>
+                    <a:defRPr/>
+                  </a:pPr>
+                  <a:endParaRPr kumimoji="0" lang="en-US" sz="1800" b="0" i="0" u="none" strike="noStrike" kern="0" cap="none" spc="0" normalizeH="0" baseline="0" noProof="0">
+                    <a:ln>
+                      <a:noFill/>
+                    </a:ln>
+                    <a:solidFill>
+                      <a:sysClr val="window" lastClr="FFFFFF"/>
+                    </a:solidFill>
+                    <a:effectLst/>
+                    <a:uLnTx/>
+                    <a:uFillTx/>
+                    <a:latin typeface="Calibri"/>
+                    <a:ea typeface="+mn-ea"/>
+                    <a:cs typeface="+mn-cs"/>
+                  </a:endParaRPr>
+                </a:p>
+              </p:txBody>
+            </p:sp>
+            <p:grpSp>
+              <p:nvGrpSpPr>
+                <p:cNvPr id="134" name="Group 133"/>
+                <p:cNvGrpSpPr/>
+                <p:nvPr/>
+              </p:nvGrpSpPr>
+              <p:grpSpPr>
+                <a:xfrm>
+                  <a:off x="437707" y="49618"/>
+                  <a:ext cx="762000" cy="91440"/>
+                  <a:chOff x="0" y="0"/>
+                  <a:chExt cx="762000" cy="144780"/>
+                </a:xfrm>
+              </p:grpSpPr>
+              <p:cxnSp>
+                <p:nvCxnSpPr>
+                  <p:cNvPr id="139" name="Straight Connector 138"/>
+                  <p:cNvCxnSpPr/>
+                  <p:nvPr/>
+                </p:nvCxnSpPr>
+                <p:spPr>
+                  <a:xfrm>
+                    <a:off x="0" y="0"/>
+                    <a:ext cx="0" cy="144780"/>
+                  </a:xfrm>
+                  <a:prstGeom prst="line">
+                    <a:avLst/>
+                  </a:prstGeom>
+                  <a:noFill/>
+                  <a:ln w="12700" cap="flat" cmpd="sng" algn="ctr">
+                    <a:solidFill>
+                      <a:sysClr val="windowText" lastClr="000000"/>
+                    </a:solidFill>
+                    <a:prstDash val="solid"/>
+                  </a:ln>
+                  <a:effectLst/>
+                </p:spPr>
+              </p:cxnSp>
+              <p:cxnSp>
+                <p:nvCxnSpPr>
+                  <p:cNvPr id="140" name="Straight Connector 139"/>
+                  <p:cNvCxnSpPr/>
+                  <p:nvPr/>
+                </p:nvCxnSpPr>
+                <p:spPr>
+                  <a:xfrm>
+                    <a:off x="152400" y="0"/>
+                    <a:ext cx="0" cy="144780"/>
+                  </a:xfrm>
+                  <a:prstGeom prst="line">
+                    <a:avLst/>
+                  </a:prstGeom>
+                  <a:noFill/>
+                  <a:ln w="12700" cap="flat" cmpd="sng" algn="ctr">
+                    <a:solidFill>
+                      <a:sysClr val="windowText" lastClr="000000"/>
+                    </a:solidFill>
+                    <a:prstDash val="solid"/>
+                  </a:ln>
+                  <a:effectLst/>
+                </p:spPr>
+              </p:cxnSp>
+              <p:cxnSp>
+                <p:nvCxnSpPr>
+                  <p:cNvPr id="141" name="Straight Connector 140"/>
+                  <p:cNvCxnSpPr/>
+                  <p:nvPr/>
+                </p:nvCxnSpPr>
+                <p:spPr>
+                  <a:xfrm>
+                    <a:off x="304800" y="0"/>
+                    <a:ext cx="0" cy="144780"/>
+                  </a:xfrm>
+                  <a:prstGeom prst="line">
+                    <a:avLst/>
+                  </a:prstGeom>
+                  <a:noFill/>
+                  <a:ln w="12700" cap="flat" cmpd="sng" algn="ctr">
+                    <a:solidFill>
+                      <a:sysClr val="windowText" lastClr="000000"/>
+                    </a:solidFill>
+                    <a:prstDash val="solid"/>
+                  </a:ln>
+                  <a:effectLst/>
+                </p:spPr>
+              </p:cxnSp>
+              <p:cxnSp>
+                <p:nvCxnSpPr>
+                  <p:cNvPr id="142" name="Straight Connector 141"/>
+                  <p:cNvCxnSpPr/>
+                  <p:nvPr/>
+                </p:nvCxnSpPr>
+                <p:spPr>
+                  <a:xfrm>
+                    <a:off x="457200" y="0"/>
+                    <a:ext cx="0" cy="144780"/>
+                  </a:xfrm>
+                  <a:prstGeom prst="line">
+                    <a:avLst/>
+                  </a:prstGeom>
+                  <a:noFill/>
+                  <a:ln w="12700" cap="flat" cmpd="sng" algn="ctr">
+                    <a:solidFill>
+                      <a:sysClr val="windowText" lastClr="000000"/>
+                    </a:solidFill>
+                    <a:prstDash val="solid"/>
+                  </a:ln>
+                  <a:effectLst/>
+                </p:spPr>
+              </p:cxnSp>
+              <p:cxnSp>
+                <p:nvCxnSpPr>
+                  <p:cNvPr id="143" name="Straight Connector 142"/>
+                  <p:cNvCxnSpPr/>
+                  <p:nvPr/>
+                </p:nvCxnSpPr>
+                <p:spPr>
+                  <a:xfrm>
+                    <a:off x="609600" y="0"/>
+                    <a:ext cx="0" cy="144780"/>
+                  </a:xfrm>
+                  <a:prstGeom prst="line">
+                    <a:avLst/>
+                  </a:prstGeom>
+                  <a:noFill/>
+                  <a:ln w="12700" cap="flat" cmpd="sng" algn="ctr">
+                    <a:solidFill>
+                      <a:sysClr val="windowText" lastClr="000000"/>
+                    </a:solidFill>
+                    <a:prstDash val="solid"/>
+                  </a:ln>
+                  <a:effectLst/>
+                </p:spPr>
+              </p:cxnSp>
+              <p:cxnSp>
+                <p:nvCxnSpPr>
+                  <p:cNvPr id="144" name="Straight Connector 143"/>
+                  <p:cNvCxnSpPr/>
+                  <p:nvPr/>
+                </p:nvCxnSpPr>
+                <p:spPr>
+                  <a:xfrm>
+                    <a:off x="762000" y="0"/>
+                    <a:ext cx="0" cy="144780"/>
+                  </a:xfrm>
+                  <a:prstGeom prst="line">
+                    <a:avLst/>
+                  </a:prstGeom>
+                  <a:noFill/>
+                  <a:ln w="12700" cap="flat" cmpd="sng" algn="ctr">
+                    <a:solidFill>
+                      <a:sysClr val="windowText" lastClr="000000"/>
+                    </a:solidFill>
+                    <a:prstDash val="solid"/>
+                  </a:ln>
+                  <a:effectLst/>
+                </p:spPr>
+              </p:cxnSp>
+            </p:grpSp>
+            <p:sp>
+              <p:nvSpPr>
+                <p:cNvPr id="135" name="Oval 134"/>
+                <p:cNvSpPr/>
+                <p:nvPr/>
+              </p:nvSpPr>
+              <p:spPr>
+                <a:xfrm>
+                  <a:off x="1105786" y="60251"/>
+                  <a:ext cx="73025" cy="73025"/>
+                </a:xfrm>
+                <a:prstGeom prst="ellipse">
+                  <a:avLst/>
+                </a:prstGeom>
+                <a:noFill/>
+                <a:ln w="19050" cap="flat" cmpd="sng" algn="ctr">
+                  <a:solidFill>
+                    <a:sysClr val="windowText" lastClr="000000"/>
+                  </a:solidFill>
+                  <a:prstDash val="solid"/>
+                </a:ln>
+                <a:effectLst/>
+              </p:spPr>
+              <p:txBody>
+                <a:bodyPr rot="0" spcFirstLastPara="0" vert="horz" wrap="square" lIns="91440" tIns="45720" rIns="91440" bIns="45720" numCol="1" spcCol="0" rtlCol="0" fromWordArt="0" anchor="ctr" anchorCtr="0" forceAA="0" compatLnSpc="1">
+                  <a:prstTxWarp prst="textNoShape">
+                    <a:avLst/>
+                  </a:prstTxWarp>
+                  <a:noAutofit/>
+                </a:bodyPr>
+                <a:lstStyle/>
+                <a:p>
+                  <a:pPr marL="0" marR="0" lvl="0" indent="0" defTabSz="914400" eaLnBrk="1" fontAlgn="auto" latinLnBrk="0" hangingPunct="1">
+                    <a:lnSpc>
+                      <a:spcPct val="100000"/>
+                    </a:lnSpc>
+                    <a:spcBef>
+                      <a:spcPts val="0"/>
+                    </a:spcBef>
+                    <a:spcAft>
+                      <a:spcPts val="0"/>
+                    </a:spcAft>
+                    <a:buClrTx/>
+                    <a:buSzTx/>
+                    <a:buFontTx/>
+                    <a:buNone/>
+                    <a:tabLst/>
+                    <a:defRPr/>
+                  </a:pPr>
+                  <a:endParaRPr kumimoji="0" lang="en-US" sz="1800" b="0" i="0" u="none" strike="noStrike" kern="0" cap="none" spc="0" normalizeH="0" baseline="0" noProof="0">
+                    <a:ln>
+                      <a:noFill/>
+                    </a:ln>
+                    <a:solidFill>
+                      <a:sysClr val="windowText" lastClr="000000"/>
+                    </a:solidFill>
+                    <a:effectLst/>
+                    <a:uLnTx/>
+                    <a:uFillTx/>
+                    <a:latin typeface="Calibri"/>
+                    <a:ea typeface="+mn-ea"/>
+                    <a:cs typeface="+mn-cs"/>
+                  </a:endParaRPr>
+                </a:p>
+              </p:txBody>
+            </p:sp>
+            <p:grpSp>
+              <p:nvGrpSpPr>
+                <p:cNvPr id="136" name="Group 135"/>
+                <p:cNvGrpSpPr/>
+                <p:nvPr/>
+              </p:nvGrpSpPr>
+              <p:grpSpPr>
+                <a:xfrm>
+                  <a:off x="0" y="58479"/>
+                  <a:ext cx="125730" cy="74295"/>
+                  <a:chOff x="0" y="0"/>
+                  <a:chExt cx="397510" cy="234950"/>
+                </a:xfrm>
+              </p:grpSpPr>
+              <p:sp>
+                <p:nvSpPr>
+                  <p:cNvPr id="137" name="Arc 136"/>
+                  <p:cNvSpPr/>
+                  <p:nvPr/>
+                </p:nvSpPr>
+                <p:spPr>
+                  <a:xfrm>
+                    <a:off x="0" y="0"/>
+                    <a:ext cx="234950" cy="234950"/>
+                  </a:xfrm>
+                  <a:prstGeom prst="arc">
+                    <a:avLst>
+                      <a:gd name="adj1" fmla="val 51734"/>
+                      <a:gd name="adj2" fmla="val 15823609"/>
+                    </a:avLst>
+                  </a:prstGeom>
+                  <a:noFill/>
+                  <a:ln w="19050" cap="rnd" cmpd="sng" algn="ctr">
+                    <a:solidFill>
+                      <a:sysClr val="windowText" lastClr="000000"/>
+                    </a:solidFill>
+                    <a:prstDash val="solid"/>
+                  </a:ln>
+                  <a:effectLst/>
+                </p:spPr>
+                <p:txBody>
+                  <a:bodyPr rot="0" spcFirstLastPara="0" vert="horz" wrap="square" lIns="91440" tIns="45720" rIns="91440" bIns="45720" numCol="1" spcCol="0" rtlCol="0" fromWordArt="0" anchor="ctr" anchorCtr="0" forceAA="0" compatLnSpc="1">
+                    <a:prstTxWarp prst="textNoShape">
+                      <a:avLst/>
+                    </a:prstTxWarp>
+                    <a:noAutofit/>
+                  </a:bodyPr>
+                  <a:lstStyle/>
+                  <a:p>
+                    <a:pPr marL="0" marR="0" lvl="0" indent="0" defTabSz="914400" eaLnBrk="1" fontAlgn="auto" latinLnBrk="0" hangingPunct="1">
+                      <a:lnSpc>
+                        <a:spcPct val="100000"/>
+                      </a:lnSpc>
+                      <a:spcBef>
+                        <a:spcPts val="0"/>
+                      </a:spcBef>
+                      <a:spcAft>
+                        <a:spcPts val="0"/>
+                      </a:spcAft>
+                      <a:buClrTx/>
+                      <a:buSzTx/>
+                      <a:buFontTx/>
+                      <a:buNone/>
+                      <a:tabLst/>
+                      <a:defRPr/>
+                    </a:pPr>
+                    <a:endParaRPr kumimoji="0" lang="en-US" sz="1800" b="0" i="0" u="none" strike="noStrike" kern="0" cap="none" spc="0" normalizeH="0" baseline="0" noProof="0">
+                      <a:ln>
+                        <a:noFill/>
+                      </a:ln>
+                      <a:solidFill>
+                        <a:sysClr val="windowText" lastClr="000000"/>
+                      </a:solidFill>
+                      <a:effectLst/>
+                      <a:uLnTx/>
+                      <a:uFillTx/>
+                      <a:latin typeface="Calibri"/>
+                      <a:ea typeface="+mn-ea"/>
+                      <a:cs typeface="+mn-cs"/>
+                    </a:endParaRPr>
+                  </a:p>
+                </p:txBody>
+              </p:sp>
+              <p:cxnSp>
+                <p:nvCxnSpPr>
+                  <p:cNvPr id="138" name="Straight Connector 137"/>
+                  <p:cNvCxnSpPr/>
+                  <p:nvPr/>
+                </p:nvCxnSpPr>
+                <p:spPr>
+                  <a:xfrm>
+                    <a:off x="228600" y="125896"/>
+                    <a:ext cx="168910" cy="0"/>
+                  </a:xfrm>
+                  <a:prstGeom prst="line">
+                    <a:avLst/>
+                  </a:prstGeom>
+                  <a:noFill/>
+                  <a:ln w="19050" cap="rnd" cmpd="sng" algn="ctr">
+                    <a:solidFill>
+                      <a:sysClr val="windowText" lastClr="000000"/>
+                    </a:solidFill>
+                    <a:prstDash val="solid"/>
+                  </a:ln>
+                  <a:effectLst/>
+                </p:spPr>
+              </p:cxnSp>
+            </p:grpSp>
+          </p:grpSp>
+          <mc:AlternateContent xmlns:mc="http://schemas.openxmlformats.org/markup-compatibility/2006">
+            <mc:Choice xmlns:a14="http://schemas.microsoft.com/office/drawing/2010/main" Requires="a14">
+              <p:sp>
+                <p:nvSpPr>
+                  <p:cNvPr id="129" name="mass"/>
+                  <p:cNvSpPr txBox="1"/>
+                  <p:nvPr/>
+                </p:nvSpPr>
+                <p:spPr>
+                  <a:xfrm>
+                    <a:off x="120161" y="1307123"/>
+                    <a:ext cx="365760" cy="365760"/>
+                  </a:xfrm>
+                  <a:prstGeom prst="rect">
+                    <a:avLst/>
+                  </a:prstGeom>
+                  <a:solidFill>
+                    <a:sysClr val="window" lastClr="FFFFFF"/>
+                  </a:solidFill>
+                  <a:ln w="19050">
+                    <a:solidFill>
+                      <a:prstClr val="black"/>
+                    </a:solidFill>
+                  </a:ln>
+                  <a:effectLst/>
+                </p:spPr>
+                <p:txBody>
+                  <a:bodyPr rot="0" spcFirstLastPara="0" vert="horz" wrap="square" lIns="91440" tIns="64008" rIns="91440" bIns="45720" numCol="1" spcCol="0" rtlCol="0" fromWordArt="0" anchor="b" anchorCtr="0" forceAA="0" compatLnSpc="1">
+                    <a:prstTxWarp prst="textNoShape">
+                      <a:avLst/>
+                    </a:prstTxWarp>
+                    <a:noAutofit/>
+                  </a:bodyPr>
+                  <a:lstStyle/>
+                  <a:p>
+                    <a:pPr marL="0" marR="0" lvl="0" indent="0" defTabSz="914400" eaLnBrk="1" fontAlgn="auto" latinLnBrk="0" hangingPunct="1">
+                      <a:lnSpc>
+                        <a:spcPct val="115000"/>
+                      </a:lnSpc>
+                      <a:spcBef>
+                        <a:spcPts val="0"/>
+                      </a:spcBef>
+                      <a:spcAft>
+                        <a:spcPts val="1000"/>
+                      </a:spcAft>
+                      <a:buClrTx/>
+                      <a:buSzTx/>
+                      <a:buFontTx/>
+                      <a:buNone/>
+                      <a:tabLst/>
+                      <a:defRPr/>
+                    </a:pPr>
+                    <a14:m>
+                      <m:oMathPara xmlns:m="http://schemas.openxmlformats.org/officeDocument/2006/math">
+                        <m:oMathParaPr>
+                          <m:jc m:val="centerGroup"/>
+                        </m:oMathParaPr>
+                        <m:oMath xmlns:m="http://schemas.openxmlformats.org/officeDocument/2006/math">
+                          <m:r>
+                            <a:rPr kumimoji="0" lang="en-US" sz="1400" b="0" i="1" u="none" strike="noStrike" kern="0" cap="none" spc="0" normalizeH="0" baseline="0" noProof="0">
+                              <a:ln>
+                                <a:noFill/>
+                              </a:ln>
+                              <a:solidFill>
+                                <a:sysClr val="windowText" lastClr="000000"/>
+                              </a:solidFill>
+                              <a:effectLst/>
+                              <a:uLnTx/>
+                              <a:uFillTx/>
+                              <a:latin typeface="Cambria Math"/>
+                              <a:ea typeface="Calibri"/>
+                              <a:cs typeface="Times New Roman"/>
+                            </a:rPr>
+                            <m:t>𝑚</m:t>
+                          </m:r>
+                        </m:oMath>
+                      </m:oMathPara>
+                    </a14:m>
+                    <a:endParaRPr kumimoji="0" lang="en-US" sz="1100" b="0" i="0" u="none" strike="noStrike" kern="0" cap="none" spc="0" normalizeH="0" baseline="0" noProof="0">
+                      <a:ln>
+                        <a:noFill/>
+                      </a:ln>
+                      <a:solidFill>
+                        <a:sysClr val="windowText" lastClr="000000"/>
+                      </a:solidFill>
+                      <a:effectLst/>
+                      <a:uLnTx/>
+                      <a:uFillTx/>
+                      <a:latin typeface="Calibri"/>
+                      <a:ea typeface="Calibri"/>
+                      <a:cs typeface="Times New Roman"/>
+                    </a:endParaRPr>
+                  </a:p>
+                </p:txBody>
+              </p:sp>
+            </mc:Choice>
+            <mc:Fallback>
+              <p:sp>
+                <p:nvSpPr>
+                  <p:cNvPr id="129" name="mass"/>
+                  <p:cNvSpPr txBox="1">
+                    <a:spLocks noRot="1" noChangeAspect="1" noMove="1" noResize="1" noEditPoints="1" noAdjustHandles="1" noChangeArrowheads="1" noChangeShapeType="1" noTextEdit="1"/>
+                  </p:cNvSpPr>
+                  <p:nvPr/>
+                </p:nvSpPr>
+                <p:spPr>
+                  <a:xfrm>
+                    <a:off x="120161" y="1307123"/>
+                    <a:ext cx="365760" cy="365760"/>
+                  </a:xfrm>
+                  <a:prstGeom prst="rect">
+                    <a:avLst/>
+                  </a:prstGeom>
+                  <a:blipFill rotWithShape="1">
+                    <a:blip r:embed="rId3"/>
+                    <a:stretch>
+                      <a:fillRect/>
+                    </a:stretch>
+                  </a:blipFill>
+                  <a:ln w="19050">
+                    <a:solidFill>
+                      <a:prstClr val="black"/>
+                    </a:solidFill>
+                  </a:ln>
+                  <a:effectLst/>
+                </p:spPr>
+                <p:txBody>
+                  <a:bodyPr/>
+                  <a:lstStyle/>
+                  <a:p>
+                    <a:r>
+                      <a:rPr lang="en-US">
+                        <a:noFill/>
+                      </a:rPr>
+                      <a:t> </a:t>
+                    </a:r>
+                  </a:p>
+                </p:txBody>
+              </p:sp>
+            </mc:Fallback>
+          </mc:AlternateContent>
+          <p:cxnSp>
+            <p:nvCxnSpPr>
+              <p:cNvPr id="130" name="Straight Connector 129"/>
+              <p:cNvCxnSpPr/>
+              <p:nvPr/>
+            </p:nvCxnSpPr>
+            <p:spPr>
+              <a:xfrm>
+                <a:off x="316523" y="-239085"/>
+                <a:ext cx="0" cy="482334"/>
+              </a:xfrm>
+              <a:prstGeom prst="line">
+                <a:avLst/>
+              </a:prstGeom>
+              <a:noFill/>
+              <a:ln w="19050" cap="flat" cmpd="sng" algn="ctr">
+                <a:solidFill>
+                  <a:sysClr val="windowText" lastClr="000000"/>
+                </a:solidFill>
+                <a:prstDash val="solid"/>
+              </a:ln>
+              <a:effectLst/>
+            </p:spPr>
+          </p:cxnSp>
+          <p:cxnSp>
+            <p:nvCxnSpPr>
+              <p:cNvPr id="131" name="Straight Connector 130"/>
+              <p:cNvCxnSpPr/>
+              <p:nvPr/>
+            </p:nvCxnSpPr>
+            <p:spPr>
+              <a:xfrm>
+                <a:off x="316523" y="1140069"/>
+                <a:ext cx="0" cy="172915"/>
+              </a:xfrm>
+              <a:prstGeom prst="line">
+                <a:avLst/>
+              </a:prstGeom>
+              <a:noFill/>
+              <a:ln w="19050" cap="flat" cmpd="sng" algn="ctr">
+                <a:solidFill>
+                  <a:sysClr val="windowText" lastClr="000000"/>
+                </a:solidFill>
+                <a:prstDash val="solid"/>
+              </a:ln>
+              <a:effectLst/>
+            </p:spPr>
+          </p:cxnSp>
+        </p:grpSp>
+        <p:grpSp>
+          <p:nvGrpSpPr>
+            <p:cNvPr id="104" name="left"/>
+            <p:cNvGrpSpPr/>
+            <p:nvPr/>
+          </p:nvGrpSpPr>
+          <p:grpSpPr>
+            <a:xfrm>
+              <a:off x="0" y="448733"/>
+              <a:ext cx="365760" cy="1932305"/>
+              <a:chOff x="120161" y="-260301"/>
+              <a:chExt cx="365760" cy="1933184"/>
+            </a:xfrm>
+          </p:grpSpPr>
+          <p:grpSp>
+            <p:nvGrpSpPr>
+              <p:cNvPr id="111" name="scale"/>
+              <p:cNvGrpSpPr/>
+              <p:nvPr/>
+            </p:nvGrpSpPr>
+            <p:grpSpPr>
+              <a:xfrm rot="16200000">
+                <a:off x="-132348" y="612068"/>
+                <a:ext cx="894419" cy="144145"/>
+                <a:chOff x="0" y="0"/>
+                <a:chExt cx="1199707" cy="193675"/>
+              </a:xfrm>
+            </p:grpSpPr>
+            <p:sp>
+              <p:nvSpPr>
+                <p:cNvPr id="115" name="Hexagon 114"/>
+                <p:cNvSpPr/>
+                <p:nvPr/>
+              </p:nvSpPr>
+              <p:spPr>
+                <a:xfrm>
+                  <a:off x="131135" y="0"/>
+                  <a:ext cx="975360" cy="193675"/>
+                </a:xfrm>
+                <a:prstGeom prst="hexagon">
+                  <a:avLst>
+                    <a:gd name="adj" fmla="val 51829"/>
+                    <a:gd name="vf" fmla="val 115470"/>
+                  </a:avLst>
+                </a:prstGeom>
+                <a:solidFill>
+                  <a:srgbClr val="0000A0"/>
+                </a:solidFill>
+                <a:ln w="19050" cap="flat" cmpd="sng" algn="ctr">
+                  <a:solidFill>
+                    <a:schemeClr val="bg1"/>
+                  </a:solidFill>
+                  <a:prstDash val="solid"/>
+                </a:ln>
+                <a:effectLst/>
+              </p:spPr>
+              <p:txBody>
+                <a:bodyPr rot="0" spcFirstLastPara="0" vert="horz" wrap="square" lIns="91440" tIns="45720" rIns="91440" bIns="45720" numCol="1" spcCol="0" rtlCol="0" fromWordArt="0" anchor="ctr" anchorCtr="0" forceAA="0" compatLnSpc="1">
+                  <a:prstTxWarp prst="textNoShape">
+                    <a:avLst/>
+                  </a:prstTxWarp>
+                  <a:noAutofit/>
+                </a:bodyPr>
+                <a:lstStyle/>
+                <a:p>
+                  <a:pPr marL="0" marR="0" lvl="0" indent="0" defTabSz="914400" eaLnBrk="1" fontAlgn="auto" latinLnBrk="0" hangingPunct="1">
+                    <a:lnSpc>
+                      <a:spcPct val="100000"/>
+                    </a:lnSpc>
+                    <a:spcBef>
+                      <a:spcPts val="0"/>
+                    </a:spcBef>
+                    <a:spcAft>
+                      <a:spcPts val="0"/>
+                    </a:spcAft>
+                    <a:buClrTx/>
+                    <a:buSzTx/>
+                    <a:buFontTx/>
+                    <a:buNone/>
+                    <a:tabLst/>
+                    <a:defRPr/>
+                  </a:pPr>
+                  <a:endParaRPr kumimoji="0" lang="en-US" sz="1800" b="0" i="0" u="none" strike="noStrike" kern="0" cap="none" spc="0" normalizeH="0" baseline="0" noProof="0">
+                    <a:ln>
+                      <a:noFill/>
+                    </a:ln>
+                    <a:solidFill>
+                      <a:sysClr val="window" lastClr="FFFFFF"/>
+                    </a:solidFill>
+                    <a:effectLst/>
+                    <a:uLnTx/>
+                    <a:uFillTx/>
+                    <a:latin typeface="Calibri"/>
+                    <a:ea typeface="+mn-ea"/>
+                    <a:cs typeface="+mn-cs"/>
+                  </a:endParaRPr>
+                </a:p>
+              </p:txBody>
+            </p:sp>
+            <p:sp>
+              <p:nvSpPr>
+                <p:cNvPr id="116" name="Rectangle 115"/>
+                <p:cNvSpPr/>
+                <p:nvPr/>
+              </p:nvSpPr>
+              <p:spPr>
+                <a:xfrm>
+                  <a:off x="377456" y="74428"/>
+                  <a:ext cx="482600" cy="45720"/>
+                </a:xfrm>
+                <a:prstGeom prst="rect">
+                  <a:avLst/>
+                </a:prstGeom>
+                <a:solidFill>
+                  <a:srgbClr val="0000A0"/>
+                </a:solidFill>
+                <a:ln w="12700" cap="flat" cmpd="sng" algn="ctr">
+                  <a:solidFill>
+                    <a:schemeClr val="bg1"/>
+                  </a:solidFill>
+                  <a:prstDash val="solid"/>
+                </a:ln>
+                <a:effectLst/>
+              </p:spPr>
+              <p:txBody>
+                <a:bodyPr rot="0" spcFirstLastPara="0" vert="horz" wrap="square" lIns="91440" tIns="45720" rIns="91440" bIns="45720" numCol="1" spcCol="0" rtlCol="0" fromWordArt="0" anchor="ctr" anchorCtr="0" forceAA="0" compatLnSpc="1">
+                  <a:prstTxWarp prst="textNoShape">
+                    <a:avLst/>
+                  </a:prstTxWarp>
+                  <a:noAutofit/>
+                </a:bodyPr>
+                <a:lstStyle/>
+                <a:p>
+                  <a:pPr marL="0" marR="0" lvl="0" indent="0" defTabSz="914400" eaLnBrk="1" fontAlgn="auto" latinLnBrk="0" hangingPunct="1">
+                    <a:lnSpc>
+                      <a:spcPct val="100000"/>
+                    </a:lnSpc>
+                    <a:spcBef>
+                      <a:spcPts val="0"/>
+                    </a:spcBef>
+                    <a:spcAft>
+                      <a:spcPts val="0"/>
+                    </a:spcAft>
+                    <a:buClrTx/>
+                    <a:buSzTx/>
+                    <a:buFontTx/>
+                    <a:buNone/>
+                    <a:tabLst/>
+                    <a:defRPr/>
+                  </a:pPr>
+                  <a:endParaRPr kumimoji="0" lang="en-US" sz="1800" b="0" i="0" u="none" strike="noStrike" kern="0" cap="none" spc="0" normalizeH="0" baseline="0" noProof="0">
+                    <a:ln>
+                      <a:noFill/>
+                    </a:ln>
+                    <a:solidFill>
+                      <a:sysClr val="window" lastClr="FFFFFF"/>
+                    </a:solidFill>
+                    <a:effectLst/>
+                    <a:uLnTx/>
+                    <a:uFillTx/>
+                    <a:latin typeface="Calibri"/>
+                    <a:ea typeface="+mn-ea"/>
+                    <a:cs typeface="+mn-cs"/>
+                  </a:endParaRPr>
+                </a:p>
+              </p:txBody>
+            </p:sp>
+            <p:grpSp>
+              <p:nvGrpSpPr>
+                <p:cNvPr id="117" name="Group 116"/>
+                <p:cNvGrpSpPr/>
+                <p:nvPr/>
+              </p:nvGrpSpPr>
+              <p:grpSpPr>
+                <a:xfrm>
+                  <a:off x="437707" y="49618"/>
+                  <a:ext cx="762000" cy="91440"/>
+                  <a:chOff x="0" y="0"/>
+                  <a:chExt cx="762000" cy="144780"/>
+                </a:xfrm>
+              </p:grpSpPr>
+              <p:cxnSp>
+                <p:nvCxnSpPr>
+                  <p:cNvPr id="122" name="Straight Connector 121"/>
+                  <p:cNvCxnSpPr/>
+                  <p:nvPr/>
+                </p:nvCxnSpPr>
+                <p:spPr>
+                  <a:xfrm>
+                    <a:off x="0" y="0"/>
+                    <a:ext cx="0" cy="144780"/>
+                  </a:xfrm>
+                  <a:prstGeom prst="line">
+                    <a:avLst/>
+                  </a:prstGeom>
+                  <a:noFill/>
+                  <a:ln w="12700" cap="flat" cmpd="sng" algn="ctr">
+                    <a:solidFill>
+                      <a:schemeClr val="bg1"/>
+                    </a:solidFill>
+                    <a:prstDash val="solid"/>
+                  </a:ln>
+                  <a:effectLst/>
+                </p:spPr>
+              </p:cxnSp>
+              <p:cxnSp>
+                <p:nvCxnSpPr>
+                  <p:cNvPr id="123" name="Straight Connector 122"/>
+                  <p:cNvCxnSpPr/>
+                  <p:nvPr/>
+                </p:nvCxnSpPr>
+                <p:spPr>
+                  <a:xfrm>
+                    <a:off x="152400" y="0"/>
+                    <a:ext cx="0" cy="144780"/>
+                  </a:xfrm>
+                  <a:prstGeom prst="line">
+                    <a:avLst/>
+                  </a:prstGeom>
+                  <a:noFill/>
+                  <a:ln w="12700" cap="flat" cmpd="sng" algn="ctr">
+                    <a:solidFill>
+                      <a:schemeClr val="bg1"/>
+                    </a:solidFill>
+                    <a:prstDash val="solid"/>
+                  </a:ln>
+                  <a:effectLst/>
+                </p:spPr>
+              </p:cxnSp>
+              <p:cxnSp>
+                <p:nvCxnSpPr>
+                  <p:cNvPr id="124" name="Straight Connector 123"/>
+                  <p:cNvCxnSpPr/>
+                  <p:nvPr/>
+                </p:nvCxnSpPr>
+                <p:spPr>
+                  <a:xfrm>
+                    <a:off x="304800" y="0"/>
+                    <a:ext cx="0" cy="144780"/>
+                  </a:xfrm>
+                  <a:prstGeom prst="line">
+                    <a:avLst/>
+                  </a:prstGeom>
+                  <a:noFill/>
+                  <a:ln w="12700" cap="flat" cmpd="sng" algn="ctr">
+                    <a:solidFill>
+                      <a:schemeClr val="bg1"/>
+                    </a:solidFill>
+                    <a:prstDash val="solid"/>
+                  </a:ln>
+                  <a:effectLst/>
+                </p:spPr>
+              </p:cxnSp>
+              <p:cxnSp>
+                <p:nvCxnSpPr>
+                  <p:cNvPr id="125" name="Straight Connector 124"/>
+                  <p:cNvCxnSpPr/>
+                  <p:nvPr/>
+                </p:nvCxnSpPr>
+                <p:spPr>
+                  <a:xfrm>
+                    <a:off x="457200" y="0"/>
+                    <a:ext cx="0" cy="144780"/>
+                  </a:xfrm>
+                  <a:prstGeom prst="line">
+                    <a:avLst/>
+                  </a:prstGeom>
+                  <a:noFill/>
+                  <a:ln w="12700" cap="flat" cmpd="sng" algn="ctr">
+                    <a:solidFill>
+                      <a:schemeClr val="bg1"/>
+                    </a:solidFill>
+                    <a:prstDash val="solid"/>
+                  </a:ln>
+                  <a:effectLst/>
+                </p:spPr>
+              </p:cxnSp>
+              <p:cxnSp>
+                <p:nvCxnSpPr>
+                  <p:cNvPr id="126" name="Straight Connector 125"/>
+                  <p:cNvCxnSpPr/>
+                  <p:nvPr/>
+                </p:nvCxnSpPr>
+                <p:spPr>
+                  <a:xfrm>
+                    <a:off x="609600" y="0"/>
+                    <a:ext cx="0" cy="144780"/>
+                  </a:xfrm>
+                  <a:prstGeom prst="line">
+                    <a:avLst/>
+                  </a:prstGeom>
+                  <a:noFill/>
+                  <a:ln w="12700" cap="flat" cmpd="sng" algn="ctr">
+                    <a:solidFill>
+                      <a:schemeClr val="bg1"/>
+                    </a:solidFill>
+                    <a:prstDash val="solid"/>
+                  </a:ln>
+                  <a:effectLst/>
+                </p:spPr>
+              </p:cxnSp>
+              <p:cxnSp>
+                <p:nvCxnSpPr>
+                  <p:cNvPr id="127" name="Straight Connector 126"/>
+                  <p:cNvCxnSpPr/>
+                  <p:nvPr/>
+                </p:nvCxnSpPr>
+                <p:spPr>
+                  <a:xfrm>
+                    <a:off x="762000" y="0"/>
+                    <a:ext cx="0" cy="144780"/>
+                  </a:xfrm>
+                  <a:prstGeom prst="line">
+                    <a:avLst/>
+                  </a:prstGeom>
+                  <a:noFill/>
+                  <a:ln w="12700" cap="flat" cmpd="sng" algn="ctr">
+                    <a:solidFill>
+                      <a:schemeClr val="bg1"/>
+                    </a:solidFill>
+                    <a:prstDash val="solid"/>
+                  </a:ln>
+                  <a:effectLst/>
+                </p:spPr>
+              </p:cxnSp>
+            </p:grpSp>
+            <p:sp>
+              <p:nvSpPr>
+                <p:cNvPr id="118" name="Oval 117"/>
+                <p:cNvSpPr/>
+                <p:nvPr/>
+              </p:nvSpPr>
+              <p:spPr>
+                <a:xfrm>
+                  <a:off x="1105786" y="60251"/>
+                  <a:ext cx="73025" cy="73025"/>
+                </a:xfrm>
+                <a:prstGeom prst="ellipse">
+                  <a:avLst/>
+                </a:prstGeom>
+                <a:noFill/>
+                <a:ln w="19050" cap="flat" cmpd="sng" algn="ctr">
+                  <a:solidFill>
+                    <a:schemeClr val="bg1"/>
+                  </a:solidFill>
+                  <a:prstDash val="solid"/>
+                </a:ln>
+                <a:effectLst/>
+              </p:spPr>
+              <p:txBody>
+                <a:bodyPr rot="0" spcFirstLastPara="0" vert="horz" wrap="square" lIns="91440" tIns="45720" rIns="91440" bIns="45720" numCol="1" spcCol="0" rtlCol="0" fromWordArt="0" anchor="ctr" anchorCtr="0" forceAA="0" compatLnSpc="1">
+                  <a:prstTxWarp prst="textNoShape">
+                    <a:avLst/>
+                  </a:prstTxWarp>
+                  <a:noAutofit/>
+                </a:bodyPr>
+                <a:lstStyle/>
+                <a:p>
+                  <a:pPr marL="0" marR="0" lvl="0" indent="0" defTabSz="914400" eaLnBrk="1" fontAlgn="auto" latinLnBrk="0" hangingPunct="1">
+                    <a:lnSpc>
+                      <a:spcPct val="100000"/>
+                    </a:lnSpc>
+                    <a:spcBef>
+                      <a:spcPts val="0"/>
+                    </a:spcBef>
+                    <a:spcAft>
+                      <a:spcPts val="0"/>
+                    </a:spcAft>
+                    <a:buClrTx/>
+                    <a:buSzTx/>
+                    <a:buFontTx/>
+                    <a:buNone/>
+                    <a:tabLst/>
+                    <a:defRPr/>
+                  </a:pPr>
+                  <a:endParaRPr kumimoji="0" lang="en-US" sz="1800" b="0" i="0" u="none" strike="noStrike" kern="0" cap="none" spc="0" normalizeH="0" baseline="0" noProof="0">
+                    <a:ln>
+                      <a:noFill/>
+                    </a:ln>
+                    <a:solidFill>
+                      <a:sysClr val="windowText" lastClr="000000"/>
+                    </a:solidFill>
+                    <a:effectLst/>
+                    <a:uLnTx/>
+                    <a:uFillTx/>
+                    <a:latin typeface="Calibri"/>
+                    <a:ea typeface="+mn-ea"/>
+                    <a:cs typeface="+mn-cs"/>
+                  </a:endParaRPr>
+                </a:p>
+              </p:txBody>
+            </p:sp>
+            <p:grpSp>
+              <p:nvGrpSpPr>
+                <p:cNvPr id="119" name="Group 118"/>
+                <p:cNvGrpSpPr/>
+                <p:nvPr/>
+              </p:nvGrpSpPr>
+              <p:grpSpPr>
+                <a:xfrm>
+                  <a:off x="0" y="58479"/>
+                  <a:ext cx="125730" cy="74295"/>
+                  <a:chOff x="0" y="0"/>
+                  <a:chExt cx="397510" cy="234950"/>
+                </a:xfrm>
+              </p:grpSpPr>
+              <p:sp>
+                <p:nvSpPr>
+                  <p:cNvPr id="120" name="Arc 119"/>
+                  <p:cNvSpPr/>
+                  <p:nvPr/>
+                </p:nvSpPr>
+                <p:spPr>
+                  <a:xfrm>
+                    <a:off x="0" y="0"/>
+                    <a:ext cx="234950" cy="234950"/>
+                  </a:xfrm>
+                  <a:prstGeom prst="arc">
+                    <a:avLst>
+                      <a:gd name="adj1" fmla="val 51734"/>
+                      <a:gd name="adj2" fmla="val 15823609"/>
+                    </a:avLst>
+                  </a:prstGeom>
+                  <a:noFill/>
+                  <a:ln w="19050" cap="rnd" cmpd="sng" algn="ctr">
+                    <a:solidFill>
+                      <a:schemeClr val="bg1"/>
+                    </a:solidFill>
+                    <a:prstDash val="solid"/>
+                  </a:ln>
+                  <a:effectLst/>
+                </p:spPr>
+                <p:txBody>
+                  <a:bodyPr rot="0" spcFirstLastPara="0" vert="horz" wrap="square" lIns="91440" tIns="45720" rIns="91440" bIns="45720" numCol="1" spcCol="0" rtlCol="0" fromWordArt="0" anchor="ctr" anchorCtr="0" forceAA="0" compatLnSpc="1">
+                    <a:prstTxWarp prst="textNoShape">
+                      <a:avLst/>
+                    </a:prstTxWarp>
+                    <a:noAutofit/>
+                  </a:bodyPr>
+                  <a:lstStyle/>
+                  <a:p>
+                    <a:pPr marL="0" marR="0" lvl="0" indent="0" defTabSz="914400" eaLnBrk="1" fontAlgn="auto" latinLnBrk="0" hangingPunct="1">
+                      <a:lnSpc>
+                        <a:spcPct val="100000"/>
+                      </a:lnSpc>
+                      <a:spcBef>
+                        <a:spcPts val="0"/>
+                      </a:spcBef>
+                      <a:spcAft>
+                        <a:spcPts val="0"/>
+                      </a:spcAft>
+                      <a:buClrTx/>
+                      <a:buSzTx/>
+                      <a:buFontTx/>
+                      <a:buNone/>
+                      <a:tabLst/>
+                      <a:defRPr/>
+                    </a:pPr>
+                    <a:endParaRPr kumimoji="0" lang="en-US" sz="1800" b="0" i="0" u="none" strike="noStrike" kern="0" cap="none" spc="0" normalizeH="0" baseline="0" noProof="0">
+                      <a:ln>
+                        <a:noFill/>
+                      </a:ln>
+                      <a:solidFill>
+                        <a:sysClr val="windowText" lastClr="000000"/>
+                      </a:solidFill>
+                      <a:effectLst/>
+                      <a:uLnTx/>
+                      <a:uFillTx/>
+                      <a:latin typeface="Calibri"/>
+                      <a:ea typeface="+mn-ea"/>
+                      <a:cs typeface="+mn-cs"/>
+                    </a:endParaRPr>
+                  </a:p>
+                </p:txBody>
+              </p:sp>
+              <p:cxnSp>
+                <p:nvCxnSpPr>
+                  <p:cNvPr id="121" name="Straight Connector 120"/>
+                  <p:cNvCxnSpPr/>
+                  <p:nvPr/>
+                </p:nvCxnSpPr>
+                <p:spPr>
+                  <a:xfrm>
+                    <a:off x="228600" y="125896"/>
+                    <a:ext cx="168910" cy="0"/>
+                  </a:xfrm>
+                  <a:prstGeom prst="line">
+                    <a:avLst/>
+                  </a:prstGeom>
+                  <a:noFill/>
+                  <a:ln w="19050" cap="rnd" cmpd="sng" algn="ctr">
+                    <a:solidFill>
+                      <a:schemeClr val="bg1"/>
+                    </a:solidFill>
+                    <a:prstDash val="solid"/>
+                  </a:ln>
+                  <a:effectLst/>
+                </p:spPr>
+              </p:cxnSp>
+            </p:grpSp>
+          </p:grpSp>
+          <mc:AlternateContent xmlns:mc="http://schemas.openxmlformats.org/markup-compatibility/2006">
+            <mc:Choice xmlns:a14="http://schemas.microsoft.com/office/drawing/2010/main" Requires="a14">
+              <p:sp>
+                <p:nvSpPr>
+                  <p:cNvPr id="112" name="mass"/>
+                  <p:cNvSpPr txBox="1"/>
+                  <p:nvPr/>
+                </p:nvSpPr>
+                <p:spPr>
+                  <a:xfrm>
+                    <a:off x="120161" y="1307123"/>
+                    <a:ext cx="365760" cy="365760"/>
+                  </a:xfrm>
+                  <a:prstGeom prst="rect">
+                    <a:avLst/>
+                  </a:prstGeom>
+                  <a:solidFill>
+                    <a:srgbClr val="0000A0"/>
+                  </a:solidFill>
+                  <a:ln w="19050">
+                    <a:solidFill>
+                      <a:schemeClr val="bg1"/>
+                    </a:solidFill>
+                  </a:ln>
+                  <a:effectLst/>
+                </p:spPr>
+                <p:txBody>
+                  <a:bodyPr rot="0" spcFirstLastPara="0" vert="horz" wrap="square" lIns="91440" tIns="64008" rIns="91440" bIns="45720" numCol="1" spcCol="0" rtlCol="0" fromWordArt="0" anchor="b" anchorCtr="0" forceAA="0" compatLnSpc="1">
+                    <a:prstTxWarp prst="textNoShape">
+                      <a:avLst/>
+                    </a:prstTxWarp>
+                    <a:noAutofit/>
+                  </a:bodyPr>
+                  <a:lstStyle/>
+                  <a:p>
+                    <a:pPr marL="0" marR="0" lvl="0" indent="0" defTabSz="914400" eaLnBrk="1" fontAlgn="auto" latinLnBrk="0" hangingPunct="1">
+                      <a:lnSpc>
+                        <a:spcPct val="115000"/>
+                      </a:lnSpc>
+                      <a:spcBef>
+                        <a:spcPts val="0"/>
+                      </a:spcBef>
+                      <a:spcAft>
+                        <a:spcPts val="1000"/>
+                      </a:spcAft>
+                      <a:buClrTx/>
+                      <a:buSzTx/>
+                      <a:buFontTx/>
+                      <a:buNone/>
+                      <a:tabLst/>
+                      <a:defRPr/>
+                    </a:pPr>
+                    <a14:m>
+                      <m:oMathPara xmlns:m="http://schemas.openxmlformats.org/officeDocument/2006/math">
+                        <m:oMathParaPr>
+                          <m:jc m:val="centerGroup"/>
+                        </m:oMathParaPr>
+                        <m:oMath xmlns:m="http://schemas.openxmlformats.org/officeDocument/2006/math">
+                          <m:r>
+                            <a:rPr kumimoji="0" lang="en-US" sz="1400" b="0" i="1" u="none" strike="noStrike" kern="0" cap="none" spc="0" normalizeH="0" baseline="0" noProof="0" smtClean="0">
+                              <a:ln>
+                                <a:noFill/>
+                              </a:ln>
+                              <a:solidFill>
+                                <a:schemeClr val="bg1"/>
+                              </a:solidFill>
+                              <a:effectLst/>
+                              <a:uLnTx/>
+                              <a:uFillTx/>
+                              <a:latin typeface="Cambria Math"/>
+                              <a:ea typeface="Calibri"/>
+                              <a:cs typeface="Times New Roman"/>
+                            </a:rPr>
+                            <m:t>𝑚</m:t>
+                          </m:r>
+                        </m:oMath>
+                      </m:oMathPara>
+                    </a14:m>
+                    <a:endParaRPr kumimoji="0" lang="en-US" sz="1100" b="0" i="0" u="none" strike="noStrike" kern="0" cap="none" spc="0" normalizeH="0" baseline="0" noProof="0" dirty="0">
+                      <a:ln>
+                        <a:noFill/>
+                      </a:ln>
+                      <a:solidFill>
+                        <a:schemeClr val="bg1"/>
+                      </a:solidFill>
+                      <a:effectLst/>
+                      <a:uLnTx/>
+                      <a:uFillTx/>
+                      <a:latin typeface="Calibri"/>
+                      <a:ea typeface="Calibri"/>
+                      <a:cs typeface="Times New Roman"/>
+                    </a:endParaRPr>
+                  </a:p>
+                </p:txBody>
+              </p:sp>
+            </mc:Choice>
+            <mc:Fallback>
+              <p:sp>
+                <p:nvSpPr>
+                  <p:cNvPr id="112" name="mass"/>
+                  <p:cNvSpPr txBox="1">
+                    <a:spLocks noRot="1" noChangeAspect="1" noMove="1" noResize="1" noEditPoints="1" noAdjustHandles="1" noChangeArrowheads="1" noChangeShapeType="1" noTextEdit="1"/>
+                  </p:cNvSpPr>
+                  <p:nvPr/>
+                </p:nvSpPr>
+                <p:spPr>
+                  <a:xfrm>
+                    <a:off x="120161" y="1307123"/>
+                    <a:ext cx="365760" cy="365760"/>
+                  </a:xfrm>
+                  <a:prstGeom prst="rect">
+                    <a:avLst/>
+                  </a:prstGeom>
+                  <a:blipFill rotWithShape="1">
+                    <a:blip r:embed="rId4"/>
+                    <a:stretch>
+                      <a:fillRect/>
+                    </a:stretch>
+                  </a:blipFill>
+                  <a:ln w="19050">
+                    <a:solidFill>
+                      <a:schemeClr val="bg1"/>
+                    </a:solidFill>
+                  </a:ln>
+                  <a:effectLst/>
+                </p:spPr>
+                <p:txBody>
+                  <a:bodyPr/>
+                  <a:lstStyle/>
+                  <a:p>
+                    <a:r>
+                      <a:rPr lang="en-US">
+                        <a:noFill/>
+                      </a:rPr>
+                      <a:t> </a:t>
+                    </a:r>
+                  </a:p>
+                </p:txBody>
+              </p:sp>
+            </mc:Fallback>
+          </mc:AlternateContent>
+          <p:cxnSp>
+            <p:nvCxnSpPr>
+              <p:cNvPr id="113" name="Straight Connector 112"/>
+              <p:cNvCxnSpPr/>
+              <p:nvPr/>
+            </p:nvCxnSpPr>
+            <p:spPr>
+              <a:xfrm>
+                <a:off x="316523" y="-260301"/>
+                <a:ext cx="0" cy="503539"/>
+              </a:xfrm>
+              <a:prstGeom prst="line">
+                <a:avLst/>
+              </a:prstGeom>
+              <a:noFill/>
+              <a:ln w="19050" cap="flat" cmpd="sng" algn="ctr">
+                <a:solidFill>
+                  <a:schemeClr val="bg1"/>
+                </a:solidFill>
+                <a:prstDash val="solid"/>
+              </a:ln>
+              <a:effectLst/>
+            </p:spPr>
+          </p:cxnSp>
+          <p:cxnSp>
+            <p:nvCxnSpPr>
+              <p:cNvPr id="114" name="Straight Connector 113"/>
+              <p:cNvCxnSpPr/>
+              <p:nvPr/>
+            </p:nvCxnSpPr>
+            <p:spPr>
+              <a:xfrm>
+                <a:off x="316523" y="1140069"/>
+                <a:ext cx="0" cy="172915"/>
+              </a:xfrm>
+              <a:prstGeom prst="line">
+                <a:avLst/>
+              </a:prstGeom>
+              <a:noFill/>
+              <a:ln w="19050" cap="flat" cmpd="sng" algn="ctr">
+                <a:solidFill>
+                  <a:schemeClr val="bg1"/>
+                </a:solidFill>
+                <a:prstDash val="solid"/>
+              </a:ln>
+              <a:effectLst/>
+            </p:spPr>
+          </p:cxnSp>
+        </p:grpSp>
+        <p:grpSp>
+          <p:nvGrpSpPr>
+            <p:cNvPr id="105" name="big pulley"/>
+            <p:cNvGrpSpPr/>
+            <p:nvPr/>
+          </p:nvGrpSpPr>
+          <p:grpSpPr>
+            <a:xfrm rot="13500000">
+              <a:off x="203200" y="156633"/>
+              <a:ext cx="549391" cy="581660"/>
+              <a:chOff x="-133405" y="-133513"/>
+              <a:chExt cx="548815" cy="579712"/>
+            </a:xfrm>
+          </p:grpSpPr>
+          <p:sp>
+            <p:nvSpPr>
+              <p:cNvPr id="109" name="Oval 108"/>
+              <p:cNvSpPr/>
+              <p:nvPr/>
+            </p:nvSpPr>
+            <p:spPr>
+              <a:xfrm flipH="1">
+                <a:off x="-133405" y="-133513"/>
+                <a:ext cx="548815" cy="548374"/>
+              </a:xfrm>
+              <a:prstGeom prst="ellipse">
+                <a:avLst/>
+              </a:prstGeom>
+              <a:solidFill>
+                <a:srgbClr val="0000A0"/>
+              </a:solidFill>
+              <a:ln w="25400" cap="flat" cmpd="sng" algn="ctr">
+                <a:solidFill>
+                  <a:schemeClr val="bg1"/>
+                </a:solidFill>
+                <a:prstDash val="solid"/>
+              </a:ln>
+              <a:effectLst/>
+            </p:spPr>
+            <p:txBody>
+              <a:bodyPr rot="0" spcFirstLastPara="0" vert="horz" wrap="square" lIns="91440" tIns="45720" rIns="91440" bIns="45720" numCol="1" spcCol="0" rtlCol="0" fromWordArt="0" anchor="ctr" anchorCtr="0" forceAA="0" compatLnSpc="1">
+                <a:prstTxWarp prst="textNoShape">
+                  <a:avLst/>
+                </a:prstTxWarp>
+                <a:noAutofit/>
+              </a:bodyPr>
+              <a:lstStyle/>
+              <a:p>
+                <a:pPr marL="0" marR="0" lvl="0" indent="0" defTabSz="914400" eaLnBrk="1" fontAlgn="auto" latinLnBrk="0" hangingPunct="1">
+                  <a:lnSpc>
+                    <a:spcPct val="100000"/>
+                  </a:lnSpc>
+                  <a:spcBef>
+                    <a:spcPts val="0"/>
+                  </a:spcBef>
+                  <a:spcAft>
+                    <a:spcPts val="0"/>
+                  </a:spcAft>
+                  <a:buClrTx/>
+                  <a:buSzTx/>
+                  <a:buFontTx/>
+                  <a:buNone/>
+                  <a:tabLst/>
+                  <a:defRPr/>
+                </a:pPr>
+                <a:endParaRPr kumimoji="0" lang="en-US" sz="1800" b="0" i="0" u="none" strike="noStrike" kern="0" cap="none" spc="0" normalizeH="0" baseline="0" noProof="0">
+                  <a:ln>
+                    <a:noFill/>
+                  </a:ln>
+                  <a:solidFill>
+                    <a:sysClr val="window" lastClr="FFFFFF"/>
+                  </a:solidFill>
+                  <a:effectLst/>
+                  <a:uLnTx/>
+                  <a:uFillTx/>
+                  <a:latin typeface="Calibri"/>
+                  <a:ea typeface="+mn-ea"/>
+                  <a:cs typeface="+mn-cs"/>
+                </a:endParaRPr>
+              </a:p>
+            </p:txBody>
+          </p:sp>
+          <p:sp>
+            <p:nvSpPr>
+              <p:cNvPr id="110" name="Pentagon 109"/>
+              <p:cNvSpPr/>
+              <p:nvPr/>
+            </p:nvSpPr>
+            <p:spPr>
+              <a:xfrm rot="2700000" flipH="1">
+                <a:off x="92075" y="206375"/>
+                <a:ext cx="356833" cy="122815"/>
+              </a:xfrm>
+              <a:prstGeom prst="homePlate">
+                <a:avLst/>
+              </a:prstGeom>
+              <a:solidFill>
+                <a:srgbClr val="0000A0"/>
+              </a:solidFill>
+              <a:ln w="25400" cap="flat" cmpd="sng" algn="ctr">
+                <a:solidFill>
+                  <a:schemeClr val="bg1"/>
+                </a:solidFill>
+                <a:prstDash val="solid"/>
+              </a:ln>
+              <a:effectLst/>
+            </p:spPr>
+            <p:txBody>
+              <a:bodyPr rot="0" spcFirstLastPara="0" vert="horz" wrap="square" lIns="91440" tIns="45720" rIns="91440" bIns="45720" numCol="1" spcCol="0" rtlCol="0" fromWordArt="0" anchor="ctr" anchorCtr="0" forceAA="0" compatLnSpc="1">
+                <a:prstTxWarp prst="textNoShape">
+                  <a:avLst/>
+                </a:prstTxWarp>
+                <a:noAutofit/>
+              </a:bodyPr>
+              <a:lstStyle/>
+              <a:p>
+                <a:pPr marL="0" marR="0" lvl="0" indent="0" defTabSz="914400" eaLnBrk="1" fontAlgn="auto" latinLnBrk="0" hangingPunct="1">
+                  <a:lnSpc>
+                    <a:spcPct val="100000"/>
+                  </a:lnSpc>
+                  <a:spcBef>
+                    <a:spcPts val="0"/>
+                  </a:spcBef>
+                  <a:spcAft>
+                    <a:spcPts val="0"/>
+                  </a:spcAft>
+                  <a:buClrTx/>
+                  <a:buSzTx/>
+                  <a:buFontTx/>
+                  <a:buNone/>
+                  <a:tabLst/>
+                  <a:defRPr/>
+                </a:pPr>
+                <a:endParaRPr kumimoji="0" lang="en-US" sz="1800" b="0" i="0" u="none" strike="noStrike" kern="0" cap="none" spc="0" normalizeH="0" baseline="0" noProof="0">
+                  <a:ln>
+                    <a:noFill/>
+                  </a:ln>
+                  <a:solidFill>
+                    <a:sysClr val="window" lastClr="FFFFFF"/>
+                  </a:solidFill>
+                  <a:effectLst/>
+                  <a:uLnTx/>
+                  <a:uFillTx/>
+                  <a:latin typeface="Calibri"/>
+                  <a:ea typeface="+mn-ea"/>
+                  <a:cs typeface="+mn-cs"/>
+                </a:endParaRPr>
+              </a:p>
+            </p:txBody>
+          </p:sp>
+        </p:grpSp>
+        <p:grpSp>
+          <p:nvGrpSpPr>
+            <p:cNvPr id="106" name="wall"/>
+            <p:cNvGrpSpPr/>
+            <p:nvPr/>
+          </p:nvGrpSpPr>
+          <p:grpSpPr>
+            <a:xfrm>
+              <a:off x="152400" y="0"/>
+              <a:ext cx="640080" cy="95250"/>
+              <a:chOff x="0" y="0"/>
+              <a:chExt cx="640080" cy="95250"/>
+            </a:xfrm>
+          </p:grpSpPr>
+          <p:sp>
+            <p:nvSpPr>
+              <p:cNvPr id="107" name="Rectangle 106"/>
+              <p:cNvSpPr/>
+              <p:nvPr/>
+            </p:nvSpPr>
+            <p:spPr>
+              <a:xfrm>
+                <a:off x="0" y="0"/>
+                <a:ext cx="640080" cy="91426"/>
+              </a:xfrm>
+              <a:prstGeom prst="rect">
+                <a:avLst/>
+              </a:prstGeom>
+              <a:pattFill prst="wdUpDiag">
+                <a:fgClr>
+                  <a:schemeClr val="bg1"/>
+                </a:fgClr>
+                <a:bgClr>
+                  <a:srgbClr val="0000A0"/>
+                </a:bgClr>
+              </a:pattFill>
+              <a:ln w="25400" cap="flat" cmpd="sng" algn="ctr">
+                <a:noFill/>
+                <a:prstDash val="solid"/>
+              </a:ln>
+              <a:effectLst/>
+            </p:spPr>
+            <p:txBody>
+              <a:bodyPr rot="0" spcFirstLastPara="0" vert="horz" wrap="square" lIns="91440" tIns="45720" rIns="91440" bIns="45720" numCol="1" spcCol="0" rtlCol="0" fromWordArt="0" anchor="ctr" anchorCtr="0" forceAA="0" compatLnSpc="1">
+                <a:prstTxWarp prst="textNoShape">
+                  <a:avLst/>
+                </a:prstTxWarp>
+                <a:noAutofit/>
+              </a:bodyPr>
+              <a:lstStyle/>
+              <a:p>
+                <a:pPr marL="0" marR="0" lvl="0" indent="0" defTabSz="914400" eaLnBrk="1" fontAlgn="auto" latinLnBrk="0" hangingPunct="1">
+                  <a:lnSpc>
+                    <a:spcPct val="100000"/>
+                  </a:lnSpc>
+                  <a:spcBef>
+                    <a:spcPts val="0"/>
+                  </a:spcBef>
+                  <a:spcAft>
+                    <a:spcPts val="0"/>
+                  </a:spcAft>
+                  <a:buClrTx/>
+                  <a:buSzTx/>
+                  <a:buFontTx/>
+                  <a:buNone/>
+                  <a:tabLst/>
+                  <a:defRPr/>
+                </a:pPr>
+                <a:endParaRPr kumimoji="0" lang="en-US" sz="1800" b="0" i="0" u="none" strike="noStrike" kern="0" cap="none" spc="0" normalizeH="0" baseline="0" noProof="0">
+                  <a:ln>
+                    <a:noFill/>
+                  </a:ln>
+                  <a:pattFill prst="pct5">
+                    <a:fgClr>
+                      <a:sysClr val="window" lastClr="FFFFFF"/>
+                    </a:fgClr>
+                    <a:bgClr>
+                      <a:schemeClr val="bg1"/>
+                    </a:bgClr>
+                  </a:pattFill>
+                  <a:effectLst/>
+                  <a:uLnTx/>
+                  <a:uFillTx/>
+                  <a:latin typeface="Calibri"/>
+                  <a:ea typeface="+mn-ea"/>
+                  <a:cs typeface="+mn-cs"/>
+                </a:endParaRPr>
+              </a:p>
+            </p:txBody>
+          </p:sp>
+          <p:cxnSp>
+            <p:nvCxnSpPr>
+              <p:cNvPr id="108" name="Straight Connector 107"/>
+              <p:cNvCxnSpPr/>
+              <p:nvPr/>
+            </p:nvCxnSpPr>
+            <p:spPr>
+              <a:xfrm>
+                <a:off x="0" y="95250"/>
+                <a:ext cx="640080" cy="0"/>
+              </a:xfrm>
+              <a:prstGeom prst="line">
+                <a:avLst/>
+              </a:prstGeom>
+              <a:noFill/>
+              <a:ln w="19050" cap="flat" cmpd="sng" algn="ctr">
+                <a:solidFill>
+                  <a:schemeClr val="bg1"/>
+                </a:solidFill>
+                <a:prstDash val="solid"/>
+              </a:ln>
+              <a:effectLst/>
+            </p:spPr>
+          </p:cxnSp>
+        </p:grpSp>
+      </p:grpSp>
+      <p:sp>
+        <p:nvSpPr>
+          <p:cNvPr id="101" name="Text Box 259"/>
+          <p:cNvSpPr txBox="1"/>
+          <p:nvPr/>
+        </p:nvSpPr>
+        <p:spPr>
+          <a:xfrm>
+            <a:off x="3205758" y="4135134"/>
+            <a:ext cx="277495" cy="274955"/>
+          </a:xfrm>
+          <a:prstGeom prst="rect">
+            <a:avLst/>
+          </a:prstGeom>
+          <a:noFill/>
+          <a:ln w="6350">
+            <a:noFill/>
+          </a:ln>
+          <a:effectLst/>
+        </p:spPr>
+        <p:txBody>
+          <a:bodyPr rot="0" spcFirstLastPara="0" vert="horz" wrap="square" lIns="91440" tIns="45720" rIns="91440" bIns="45720" numCol="1" spcCol="0" rtlCol="0" fromWordArt="0" anchor="t" anchorCtr="0" forceAA="0" compatLnSpc="1">
+            <a:prstTxWarp prst="textNoShape">
+              <a:avLst/>
+            </a:prstTxWarp>
+            <a:noAutofit/>
+          </a:bodyPr>
+          <a:lstStyle/>
+          <a:p>
+            <a:pPr marL="0" marR="0" lvl="0" indent="0" defTabSz="914400" eaLnBrk="1" fontAlgn="auto" latinLnBrk="0" hangingPunct="1">
+              <a:lnSpc>
+                <a:spcPct val="115000"/>
+              </a:lnSpc>
+              <a:spcBef>
+                <a:spcPts val="0"/>
+              </a:spcBef>
+              <a:spcAft>
+                <a:spcPts val="1000"/>
+              </a:spcAft>
+              <a:buClrTx/>
+              <a:buSzTx/>
+              <a:buFontTx/>
+              <a:buNone/>
+              <a:tabLst/>
+              <a:defRPr/>
+            </a:pPr>
+            <a:r>
+              <a:rPr kumimoji="0" lang="en-US" sz="1400" b="0" i="0" u="none" strike="noStrike" kern="0" cap="none" spc="0" normalizeH="0" baseline="0" noProof="0">
+                <a:ln>
+                  <a:noFill/>
+                </a:ln>
+                <a:solidFill>
+                  <a:schemeClr val="bg1"/>
+                </a:solidFill>
+                <a:effectLst/>
+                <a:uLnTx/>
+                <a:uFillTx/>
+                <a:latin typeface="Calibri"/>
+                <a:ea typeface="Calibri"/>
+                <a:cs typeface="Times New Roman"/>
+              </a:rPr>
+              <a:t>F</a:t>
+            </a:r>
+            <a:endParaRPr kumimoji="0" lang="en-US" sz="1100" b="0" i="0" u="none" strike="noStrike" kern="0" cap="none" spc="0" normalizeH="0" baseline="0" noProof="0">
+              <a:ln>
+                <a:noFill/>
+              </a:ln>
+              <a:solidFill>
+                <a:schemeClr val="bg1"/>
+              </a:solidFill>
+              <a:effectLst/>
+              <a:uLnTx/>
+              <a:uFillTx/>
+              <a:latin typeface="Calibri"/>
+              <a:ea typeface="Calibri"/>
+              <a:cs typeface="Times New Roman"/>
+            </a:endParaRPr>
+          </a:p>
+        </p:txBody>
+      </p:sp>
+      <p:sp>
+        <p:nvSpPr>
+          <p:cNvPr id="102" name="Text Box 260"/>
+          <p:cNvSpPr txBox="1"/>
+          <p:nvPr/>
+        </p:nvSpPr>
+        <p:spPr>
+          <a:xfrm>
+            <a:off x="4169053" y="4156724"/>
+            <a:ext cx="277495" cy="274955"/>
+          </a:xfrm>
+          <a:prstGeom prst="rect">
+            <a:avLst/>
+          </a:prstGeom>
+          <a:noFill/>
+          <a:ln w="6350">
+            <a:noFill/>
+          </a:ln>
+          <a:effectLst/>
+        </p:spPr>
+        <p:txBody>
+          <a:bodyPr rot="0" spcFirstLastPara="0" vert="horz" wrap="square" lIns="91440" tIns="45720" rIns="91440" bIns="45720" numCol="1" spcCol="0" rtlCol="0" fromWordArt="0" anchor="t" anchorCtr="0" forceAA="0" compatLnSpc="1">
+            <a:prstTxWarp prst="textNoShape">
+              <a:avLst/>
+            </a:prstTxWarp>
+            <a:noAutofit/>
+          </a:bodyPr>
+          <a:lstStyle/>
+          <a:p>
+            <a:pPr marL="0" marR="0" lvl="0" indent="0" defTabSz="914400" eaLnBrk="1" fontAlgn="auto" latinLnBrk="0" hangingPunct="1">
+              <a:lnSpc>
+                <a:spcPct val="115000"/>
+              </a:lnSpc>
+              <a:spcBef>
+                <a:spcPts val="0"/>
+              </a:spcBef>
+              <a:spcAft>
+                <a:spcPts val="1000"/>
+              </a:spcAft>
+              <a:buClrTx/>
+              <a:buSzTx/>
+              <a:buFontTx/>
+              <a:buNone/>
+              <a:tabLst/>
+              <a:defRPr/>
+            </a:pPr>
+            <a:r>
+              <a:rPr kumimoji="0" lang="en-US" sz="1400" b="0" i="0" u="none" strike="noStrike" kern="0" cap="none" spc="0" normalizeH="0" baseline="0" noProof="0" dirty="0">
+                <a:ln>
+                  <a:noFill/>
+                </a:ln>
+                <a:solidFill>
+                  <a:schemeClr val="bg1"/>
+                </a:solidFill>
+                <a:effectLst/>
+                <a:uLnTx/>
+                <a:uFillTx/>
+                <a:latin typeface="Calibri"/>
+                <a:ea typeface="Calibri"/>
+                <a:cs typeface="Times New Roman"/>
+              </a:rPr>
+              <a:t>G</a:t>
+            </a:r>
+            <a:endParaRPr kumimoji="0" lang="en-US" sz="1100" b="0" i="0" u="none" strike="noStrike" kern="0" cap="none" spc="0" normalizeH="0" baseline="0" noProof="0" dirty="0">
+              <a:ln>
+                <a:noFill/>
+              </a:ln>
+              <a:solidFill>
+                <a:schemeClr val="bg1"/>
+              </a:solidFill>
+              <a:effectLst/>
+              <a:uLnTx/>
+              <a:uFillTx/>
+              <a:latin typeface="Calibri"/>
+              <a:ea typeface="Calibri"/>
+              <a:cs typeface="Times New Roman"/>
+            </a:endParaRPr>
+          </a:p>
+        </p:txBody>
+      </p:sp>
+    </p:spTree>
+    <p:extLst>
+      <p:ext uri="{BB962C8B-B14F-4D97-AF65-F5344CB8AC3E}">
+        <p14:creationId xmlns:p14="http://schemas.microsoft.com/office/powerpoint/2010/main" val="2946318416"/>
+      </p:ext>
+    </p:extLst>
+  </p:cSld>
+  <p:clrMapOvr>
+    <a:masterClrMapping/>
+  </p:clrMapOvr>
+</p:sld>
+</file>
+
 <file path=ppt/theme/theme1.xml><?xml version="1.0" encoding="utf-8"?>
 <a:theme xmlns:a="http://schemas.openxmlformats.org/drawingml/2006/main" name="Office Theme">
   <a:themeElements>

</xml_diff>

<commit_message>
Lighter blue for cover page
Looks better on the Print Shop's printer; somehow their colors come out
much darker.
</commit_message>
<xml_diff>
--- a/StudentGuideModule1/131_front_pages/131_front_cover.pptx
+++ b/StudentGuideModule1/131_front_pages/131_front_cover.pptx
@@ -208,7 +208,7 @@
           <a:p>
             <a:fld id="{6721B4BD-1C89-4CEC-857E-88D7AB01A253}" type="datetimeFigureOut">
               <a:rPr lang="en-US" smtClean="0"/>
-              <a:t>5/20/2016</a:t>
+              <a:t>5/28/2016</a:t>
             </a:fld>
             <a:endParaRPr lang="en-US"/>
           </a:p>
@@ -742,7 +742,7 @@
             <a:fld id="{1D8BD707-D9CF-40AE-B4C6-C98DA3205C09}" type="datetimeFigureOut">
               <a:rPr lang="en-US" smtClean="0"/>
               <a:pPr/>
-              <a:t>5/20/2016</a:t>
+              <a:t>5/28/2016</a:t>
             </a:fld>
             <a:endParaRPr lang="en-US"/>
           </a:p>
@@ -909,7 +909,7 @@
             <a:fld id="{1D8BD707-D9CF-40AE-B4C6-C98DA3205C09}" type="datetimeFigureOut">
               <a:rPr lang="en-US" smtClean="0"/>
               <a:pPr/>
-              <a:t>5/20/2016</a:t>
+              <a:t>5/28/2016</a:t>
             </a:fld>
             <a:endParaRPr lang="en-US"/>
           </a:p>
@@ -1086,7 +1086,7 @@
             <a:fld id="{1D8BD707-D9CF-40AE-B4C6-C98DA3205C09}" type="datetimeFigureOut">
               <a:rPr lang="en-US" smtClean="0"/>
               <a:pPr/>
-              <a:t>5/20/2016</a:t>
+              <a:t>5/28/2016</a:t>
             </a:fld>
             <a:endParaRPr lang="en-US"/>
           </a:p>
@@ -1253,7 +1253,7 @@
             <a:fld id="{1D8BD707-D9CF-40AE-B4C6-C98DA3205C09}" type="datetimeFigureOut">
               <a:rPr lang="en-US" smtClean="0"/>
               <a:pPr/>
-              <a:t>5/20/2016</a:t>
+              <a:t>5/28/2016</a:t>
             </a:fld>
             <a:endParaRPr lang="en-US"/>
           </a:p>
@@ -1496,7 +1496,7 @@
             <a:fld id="{1D8BD707-D9CF-40AE-B4C6-C98DA3205C09}" type="datetimeFigureOut">
               <a:rPr lang="en-US" smtClean="0"/>
               <a:pPr/>
-              <a:t>5/20/2016</a:t>
+              <a:t>5/28/2016</a:t>
             </a:fld>
             <a:endParaRPr lang="en-US"/>
           </a:p>
@@ -1781,7 +1781,7 @@
             <a:fld id="{1D8BD707-D9CF-40AE-B4C6-C98DA3205C09}" type="datetimeFigureOut">
               <a:rPr lang="en-US" smtClean="0"/>
               <a:pPr/>
-              <a:t>5/20/2016</a:t>
+              <a:t>5/28/2016</a:t>
             </a:fld>
             <a:endParaRPr lang="en-US"/>
           </a:p>
@@ -2200,7 +2200,7 @@
             <a:fld id="{1D8BD707-D9CF-40AE-B4C6-C98DA3205C09}" type="datetimeFigureOut">
               <a:rPr lang="en-US" smtClean="0"/>
               <a:pPr/>
-              <a:t>5/20/2016</a:t>
+              <a:t>5/28/2016</a:t>
             </a:fld>
             <a:endParaRPr lang="en-US"/>
           </a:p>
@@ -2315,7 +2315,7 @@
             <a:fld id="{1D8BD707-D9CF-40AE-B4C6-C98DA3205C09}" type="datetimeFigureOut">
               <a:rPr lang="en-US" smtClean="0"/>
               <a:pPr/>
-              <a:t>5/20/2016</a:t>
+              <a:t>5/28/2016</a:t>
             </a:fld>
             <a:endParaRPr lang="en-US"/>
           </a:p>
@@ -2407,7 +2407,7 @@
             <a:fld id="{1D8BD707-D9CF-40AE-B4C6-C98DA3205C09}" type="datetimeFigureOut">
               <a:rPr lang="en-US" smtClean="0"/>
               <a:pPr/>
-              <a:t>5/20/2016</a:t>
+              <a:t>5/28/2016</a:t>
             </a:fld>
             <a:endParaRPr lang="en-US"/>
           </a:p>
@@ -2681,7 +2681,7 @@
             <a:fld id="{1D8BD707-D9CF-40AE-B4C6-C98DA3205C09}" type="datetimeFigureOut">
               <a:rPr lang="en-US" smtClean="0"/>
               <a:pPr/>
-              <a:t>5/20/2016</a:t>
+              <a:t>5/28/2016</a:t>
             </a:fld>
             <a:endParaRPr lang="en-US"/>
           </a:p>
@@ -2931,7 +2931,7 @@
             <a:fld id="{1D8BD707-D9CF-40AE-B4C6-C98DA3205C09}" type="datetimeFigureOut">
               <a:rPr lang="en-US" smtClean="0"/>
               <a:pPr/>
-              <a:t>5/20/2016</a:t>
+              <a:t>5/28/2016</a:t>
             </a:fld>
             <a:endParaRPr lang="en-US"/>
           </a:p>
@@ -3141,7 +3141,7 @@
             <a:fld id="{1D8BD707-D9CF-40AE-B4C6-C98DA3205C09}" type="datetimeFigureOut">
               <a:rPr lang="en-US" smtClean="0"/>
               <a:pPr/>
-              <a:t>5/20/2016</a:t>
+              <a:t>5/28/2016</a:t>
             </a:fld>
             <a:endParaRPr lang="en-US"/>
           </a:p>
@@ -3527,7 +3527,7 @@
             <a:avLst/>
           </a:prstGeom>
           <a:solidFill>
-            <a:srgbClr val="0000A0"/>
+            <a:srgbClr val="0080FF"/>
           </a:solidFill>
           <a:ln>
             <a:noFill/>
@@ -3568,6 +3568,16 @@
         </p:nvPicPr>
         <p:blipFill>
           <a:blip r:embed="rId3">
+            <a:clrChange>
+              <a:clrFrom>
+                <a:srgbClr val="0000A0"/>
+              </a:clrFrom>
+              <a:clrTo>
+                <a:srgbClr val="0000A0">
+                  <a:alpha val="0"/>
+                </a:srgbClr>
+              </a:clrTo>
+            </a:clrChange>
             <a:extLst>
               <a:ext uri="{28A0092B-C50C-407E-A947-70E740481C1C}">
                 <a14:useLocalDpi xmlns:a14="http://schemas.microsoft.com/office/drawing/2010/main" val="0"/>
@@ -3622,6 +3632,16 @@
           </p:nvPicPr>
           <p:blipFill>
             <a:blip r:embed="rId4">
+              <a:clrChange>
+                <a:clrFrom>
+                  <a:srgbClr val="0000A0"/>
+                </a:clrFrom>
+                <a:clrTo>
+                  <a:srgbClr val="0000A0">
+                    <a:alpha val="0"/>
+                  </a:srgbClr>
+                </a:clrTo>
+              </a:clrChange>
               <a:extLst>
                 <a:ext uri="{28A0092B-C50C-407E-A947-70E740481C1C}">
                   <a14:useLocalDpi xmlns:a14="http://schemas.microsoft.com/office/drawing/2010/main" val="0"/>
@@ -4520,6 +4540,16 @@
           </p:nvPicPr>
           <p:blipFill rotWithShape="1">
             <a:blip r:embed="rId7" cstate="print">
+              <a:clrChange>
+                <a:clrFrom>
+                  <a:srgbClr val="0000A0"/>
+                </a:clrFrom>
+                <a:clrTo>
+                  <a:srgbClr val="0000A0">
+                    <a:alpha val="0"/>
+                  </a:srgbClr>
+                </a:clrTo>
+              </a:clrChange>
               <a:extLst>
                 <a:ext uri="{28A0092B-C50C-407E-A947-70E740481C1C}">
                   <a14:useLocalDpi xmlns:a14="http://schemas.microsoft.com/office/drawing/2010/main" val="0"/>
@@ -5251,6 +5281,16 @@
           </p:nvPicPr>
           <p:blipFill>
             <a:blip r:embed="rId12" cstate="hqprint">
+              <a:clrChange>
+                <a:clrFrom>
+                  <a:srgbClr val="0000A0"/>
+                </a:clrFrom>
+                <a:clrTo>
+                  <a:srgbClr val="0000A0">
+                    <a:alpha val="0"/>
+                  </a:srgbClr>
+                </a:clrTo>
+              </a:clrChange>
               <a:extLst>
                 <a:ext uri="{28A0092B-C50C-407E-A947-70E740481C1C}">
                   <a14:useLocalDpi xmlns:a14="http://schemas.microsoft.com/office/drawing/2010/main" val="0"/>
@@ -5434,7 +5474,7 @@
               <a:avLst/>
             </a:prstGeom>
             <a:solidFill>
-              <a:srgbClr val="0000A0"/>
+              <a:srgbClr val="0080FF"/>
             </a:solidFill>
             <a:ln w="19050">
               <a:noFill/>
@@ -6601,7 +6641,7 @@
                 </a:avLst>
               </a:prstGeom>
               <a:solidFill>
-                <a:srgbClr val="0000A0"/>
+                <a:srgbClr val="0080FF"/>
               </a:solidFill>
               <a:ln w="12700" cap="flat" cmpd="sng" algn="ctr">
                 <a:solidFill>
@@ -6668,9 +6708,7 @@
               <a:prstGeom prst="rect">
                 <a:avLst/>
               </a:prstGeom>
-              <a:solidFill>
-                <a:srgbClr val="0000A0"/>
-              </a:solidFill>
+              <a:noFill/>
               <a:ln w="9525" cap="flat" cmpd="sng" algn="ctr">
                 <a:solidFill>
                   <a:schemeClr val="bg1"/>
@@ -7332,7 +7370,7 @@
                 </a:avLst>
               </a:prstGeom>
               <a:solidFill>
-                <a:srgbClr val="0000A0"/>
+                <a:srgbClr val="0080FF"/>
               </a:solidFill>
               <a:ln w="12700" cap="flat" cmpd="sng" algn="ctr">
                 <a:solidFill>
@@ -7399,9 +7437,7 @@
               <a:prstGeom prst="rect">
                 <a:avLst/>
               </a:prstGeom>
-              <a:solidFill>
-                <a:srgbClr val="0000A0"/>
-              </a:solidFill>
+              <a:noFill/>
               <a:ln w="9525" cap="flat" cmpd="sng" algn="ctr">
                 <a:solidFill>
                   <a:schemeClr val="bg1"/>
@@ -8060,7 +8096,7 @@
                 <a:avLst/>
               </a:prstGeom>
               <a:solidFill>
-                <a:srgbClr val="0000A0"/>
+                <a:srgbClr val="0080FF"/>
               </a:solidFill>
               <a:ln w="12700" cap="flat" cmpd="sng" algn="ctr">
                 <a:solidFill>
@@ -8128,7 +8164,7 @@
                 <a:avLst/>
               </a:prstGeom>
               <a:solidFill>
-                <a:srgbClr val="0000A0"/>
+                <a:srgbClr val="0080FF"/>
               </a:solidFill>
               <a:ln w="12700" cap="flat" cmpd="sng" algn="ctr">
                 <a:solidFill>
@@ -8215,7 +8251,7 @@
                   <a:schemeClr val="bg1"/>
                 </a:fgClr>
                 <a:bgClr>
-                  <a:srgbClr val="0000A0"/>
+                  <a:srgbClr val="0080FF"/>
                 </a:bgClr>
               </a:pattFill>
               <a:ln w="12700" cap="flat" cmpd="sng" algn="ctr">
@@ -8482,6 +8518,16 @@
           </p:nvPicPr>
           <p:blipFill rotWithShape="1">
             <a:blip r:embed="rId26" cstate="hqprint">
+              <a:clrChange>
+                <a:clrFrom>
+                  <a:srgbClr val="0000A0"/>
+                </a:clrFrom>
+                <a:clrTo>
+                  <a:srgbClr val="0000A0">
+                    <a:alpha val="0"/>
+                  </a:srgbClr>
+                </a:clrTo>
+              </a:clrChange>
               <a:extLst>
                 <a:ext uri="{28A0092B-C50C-407E-A947-70E740481C1C}">
                   <a14:useLocalDpi xmlns:a14="http://schemas.microsoft.com/office/drawing/2010/main" val="0"/>
@@ -9560,7 +9606,7 @@
                     <a:schemeClr val="bg1"/>
                   </a:fgClr>
                   <a:bgClr>
-                    <a:srgbClr val="0000A0"/>
+                    <a:srgbClr val="0080FF"/>
                   </a:bgClr>
                 </a:pattFill>
                 <a:ln w="19050">
@@ -10653,7 +10699,7 @@
                 </a:schemeClr>
               </a:fgClr>
               <a:bgClr>
-                <a:srgbClr val="0000A0"/>
+                <a:srgbClr val="0080FF"/>
               </a:bgClr>
             </a:pattFill>
             <a:ln w="12700">
@@ -12491,7 +12537,7 @@
                   <a:avLst/>
                 </a:prstGeom>
                 <a:solidFill>
-                  <a:srgbClr val="0000A0"/>
+                  <a:srgbClr val="0080FF"/>
                 </a:solidFill>
                 <a:ln w="12700">
                   <a:solidFill>
@@ -12808,7 +12854,7 @@
                   <a:avLst/>
                 </a:prstGeom>
                 <a:solidFill>
-                  <a:srgbClr val="0000A0"/>
+                  <a:srgbClr val="0080FF"/>
                 </a:solidFill>
                 <a:ln w="12700">
                   <a:solidFill>
@@ -13125,7 +13171,7 @@
                   <a:avLst/>
                 </a:prstGeom>
                 <a:solidFill>
-                  <a:srgbClr val="0000A0"/>
+                  <a:srgbClr val="0080FF"/>
                 </a:solidFill>
                 <a:ln w="12700">
                   <a:solidFill>
@@ -13442,7 +13488,7 @@
                   <a:avLst/>
                 </a:prstGeom>
                 <a:solidFill>
-                  <a:srgbClr val="0000A0"/>
+                  <a:srgbClr val="0080FF"/>
                 </a:solidFill>
                 <a:ln w="12700">
                   <a:solidFill>
@@ -15332,6 +15378,16 @@
         </p:nvPicPr>
         <p:blipFill>
           <a:blip r:embed="rId39">
+            <a:clrChange>
+              <a:clrFrom>
+                <a:srgbClr val="0000A0"/>
+              </a:clrFrom>
+              <a:clrTo>
+                <a:srgbClr val="0000A0">
+                  <a:alpha val="0"/>
+                </a:srgbClr>
+              </a:clrTo>
+            </a:clrChange>
             <a:extLst>
               <a:ext uri="{28A0092B-C50C-407E-A947-70E740481C1C}">
                 <a14:useLocalDpi xmlns:a14="http://schemas.microsoft.com/office/drawing/2010/main" val="0"/>
@@ -15833,7 +15889,7 @@
                 <a:schemeClr val="bg1"/>
               </a:fgClr>
               <a:bgClr>
-                <a:srgbClr val="0000A0"/>
+                <a:srgbClr val="0080FF"/>
               </a:bgClr>
             </a:pattFill>
             <a:ln w="12700">
@@ -16083,7 +16139,7 @@
               </a:pathLst>
             </a:custGeom>
             <a:solidFill>
-              <a:srgbClr val="0000A0"/>
+              <a:srgbClr val="0080FF"/>
             </a:solidFill>
             <a:ln>
               <a:noFill/>
@@ -16589,7 +16645,7 @@
           <p:spPr bwMode="auto">
             <a:xfrm>
               <a:off x="5525769" y="6117203"/>
-              <a:ext cx="431876" cy="440690"/>
+              <a:ext cx="431876" cy="440689"/>
             </a:xfrm>
             <a:prstGeom prst="rect">
               <a:avLst/>
@@ -19262,7 +19318,7 @@
               <a:avLst/>
             </a:prstGeom>
             <a:solidFill>
-              <a:srgbClr val="0000A0"/>
+              <a:srgbClr val="0080FF"/>
             </a:solidFill>
             <a:ln w="19050">
               <a:solidFill>

</xml_diff>